<commit_message>
post-preprocessing: violin plot + improvements of boxplots
</commit_message>
<xml_diff>
--- a/papers/.ppt/TimeSeriesCV_26072024.pptx
+++ b/papers/.ppt/TimeSeriesCV_26072024.pptx
@@ -10,6 +10,13 @@
     <p:sldId id="312" r:id="rId4"/>
     <p:sldId id="361" r:id="rId5"/>
     <p:sldId id="360" r:id="rId6"/>
+    <p:sldId id="363" r:id="rId7"/>
+    <p:sldId id="362" r:id="rId8"/>
+    <p:sldId id="364" r:id="rId9"/>
+    <p:sldId id="365" r:id="rId10"/>
+    <p:sldId id="366" r:id="rId11"/>
+    <p:sldId id="367" r:id="rId12"/>
+    <p:sldId id="368" r:id="rId13"/>
   </p:sldIdLst>
   <p:sldSz cx="12192000" cy="6858000"/>
   <p:notesSz cx="6858000" cy="9144000"/>
@@ -122,6 +129,13 @@
             <p14:sldId id="312"/>
             <p14:sldId id="361"/>
             <p14:sldId id="360"/>
+            <p14:sldId id="363"/>
+            <p14:sldId id="362"/>
+            <p14:sldId id="364"/>
+            <p14:sldId id="365"/>
+            <p14:sldId id="366"/>
+            <p14:sldId id="367"/>
+            <p14:sldId id="368"/>
           </p14:sldIdLst>
         </p14:section>
       </p14:sectionLst>
@@ -3404,7 +3418,7 @@
                 <a:latin typeface="Microsoft JhengHei UI" panose="020B0604030504040204" pitchFamily="34" charset="-120"/>
                 <a:ea typeface="Microsoft JhengHei UI" panose="020B0604030504040204" pitchFamily="34" charset="-120"/>
               </a:rPr>
-              <a:t>07/06/2024</a:t>
+              <a:t>26/07/2024</a:t>
             </a:r>
           </a:p>
         </p:txBody>
@@ -3413,6 +3427,695 @@
     <p:extLst>
       <p:ext uri="{BB962C8B-B14F-4D97-AF65-F5344CB8AC3E}">
         <p14:creationId xmlns:p14="http://schemas.microsoft.com/office/powerpoint/2010/main" val="48581722"/>
+      </p:ext>
+    </p:extLst>
+  </p:cSld>
+  <p:clrMapOvr>
+    <a:masterClrMapping/>
+  </p:clrMapOvr>
+</p:sld>
+</file>
+
+<file path=ppt/slides/slide10.xml><?xml version="1.0" encoding="utf-8"?>
+<p:sld xmlns:a="http://schemas.openxmlformats.org/drawingml/2006/main" xmlns:r="http://schemas.openxmlformats.org/officeDocument/2006/relationships" xmlns:p="http://schemas.openxmlformats.org/presentationml/2006/main">
+  <p:cSld>
+    <p:spTree>
+      <p:nvGrpSpPr>
+        <p:cNvPr id="1" name=""/>
+        <p:cNvGrpSpPr/>
+        <p:nvPr/>
+      </p:nvGrpSpPr>
+      <p:grpSpPr>
+        <a:xfrm>
+          <a:off x="0" y="0"/>
+          <a:ext cx="0" cy="0"/>
+          <a:chOff x="0" y="0"/>
+          <a:chExt cx="0" cy="0"/>
+        </a:xfrm>
+      </p:grpSpPr>
+      <p:sp>
+        <p:nvSpPr>
+          <p:cNvPr id="2" name="Title 1">
+            <a:extLst>
+              <a:ext uri="{FF2B5EF4-FFF2-40B4-BE49-F238E27FC236}">
+                <a16:creationId xmlns:a16="http://schemas.microsoft.com/office/drawing/2014/main" id="{035535A7-2050-475D-94CA-7B0B00D4DD72}"/>
+              </a:ext>
+            </a:extLst>
+          </p:cNvPr>
+          <p:cNvSpPr>
+            <a:spLocks noGrp="1"/>
+          </p:cNvSpPr>
+          <p:nvPr>
+            <p:ph type="title"/>
+          </p:nvPr>
+        </p:nvSpPr>
+        <p:spPr/>
+        <p:txBody>
+          <a:bodyPr/>
+          <a:lstStyle/>
+          <a:p>
+            <a:r>
+              <a:rPr lang="en-US" dirty="0"/>
+              <a:t>Overall Results - ARMA</a:t>
+            </a:r>
+          </a:p>
+        </p:txBody>
+      </p:sp>
+      <p:pic>
+        <p:nvPicPr>
+          <p:cNvPr id="7" name="Picture 6">
+            <a:extLst>
+              <a:ext uri="{FF2B5EF4-FFF2-40B4-BE49-F238E27FC236}">
+                <a16:creationId xmlns:a16="http://schemas.microsoft.com/office/drawing/2014/main" id="{42039116-598A-4525-B7F2-14573902172C}"/>
+              </a:ext>
+            </a:extLst>
+          </p:cNvPr>
+          <p:cNvPicPr>
+            <a:picLocks noChangeAspect="1"/>
+          </p:cNvPicPr>
+          <p:nvPr/>
+        </p:nvPicPr>
+        <p:blipFill>
+          <a:blip r:embed="rId2"/>
+          <a:stretch>
+            <a:fillRect/>
+          </a:stretch>
+        </p:blipFill>
+        <p:spPr>
+          <a:xfrm>
+            <a:off x="838200" y="1399032"/>
+            <a:ext cx="10820192" cy="5458968"/>
+          </a:xfrm>
+          <a:prstGeom prst="rect">
+            <a:avLst/>
+          </a:prstGeom>
+        </p:spPr>
+      </p:pic>
+    </p:spTree>
+    <p:extLst>
+      <p:ext uri="{BB962C8B-B14F-4D97-AF65-F5344CB8AC3E}">
+        <p14:creationId xmlns:p14="http://schemas.microsoft.com/office/powerpoint/2010/main" val="1305389089"/>
+      </p:ext>
+    </p:extLst>
+  </p:cSld>
+  <p:clrMapOvr>
+    <a:masterClrMapping/>
+  </p:clrMapOvr>
+</p:sld>
+</file>
+
+<file path=ppt/slides/slide11.xml><?xml version="1.0" encoding="utf-8"?>
+<p:sld xmlns:a="http://schemas.openxmlformats.org/drawingml/2006/main" xmlns:r="http://schemas.openxmlformats.org/officeDocument/2006/relationships" xmlns:p="http://schemas.openxmlformats.org/presentationml/2006/main">
+  <p:cSld>
+    <p:spTree>
+      <p:nvGrpSpPr>
+        <p:cNvPr id="1" name=""/>
+        <p:cNvGrpSpPr/>
+        <p:nvPr/>
+      </p:nvGrpSpPr>
+      <p:grpSpPr>
+        <a:xfrm>
+          <a:off x="0" y="0"/>
+          <a:ext cx="0" cy="0"/>
+          <a:chOff x="0" y="0"/>
+          <a:chExt cx="0" cy="0"/>
+        </a:xfrm>
+      </p:grpSpPr>
+      <p:sp>
+        <p:nvSpPr>
+          <p:cNvPr id="2" name="Title 1">
+            <a:extLst>
+              <a:ext uri="{FF2B5EF4-FFF2-40B4-BE49-F238E27FC236}">
+                <a16:creationId xmlns:a16="http://schemas.microsoft.com/office/drawing/2014/main" id="{035535A7-2050-475D-94CA-7B0B00D4DD72}"/>
+              </a:ext>
+            </a:extLst>
+          </p:cNvPr>
+          <p:cNvSpPr>
+            <a:spLocks noGrp="1"/>
+          </p:cNvSpPr>
+          <p:nvPr>
+            <p:ph type="title"/>
+          </p:nvPr>
+        </p:nvSpPr>
+        <p:spPr/>
+        <p:txBody>
+          <a:bodyPr/>
+          <a:lstStyle/>
+          <a:p>
+            <a:r>
+              <a:rPr lang="en-US" dirty="0"/>
+              <a:t>Should We Train In the Future?</a:t>
+            </a:r>
+          </a:p>
+        </p:txBody>
+      </p:sp>
+      <p:pic>
+        <p:nvPicPr>
+          <p:cNvPr id="6" name="Content Placeholder 5">
+            <a:extLst>
+              <a:ext uri="{FF2B5EF4-FFF2-40B4-BE49-F238E27FC236}">
+                <a16:creationId xmlns:a16="http://schemas.microsoft.com/office/drawing/2014/main" id="{F683F673-07F5-4E2C-BE8D-B371615710CA}"/>
+              </a:ext>
+            </a:extLst>
+          </p:cNvPr>
+          <p:cNvPicPr>
+            <a:picLocks noGrp="1" noChangeAspect="1"/>
+          </p:cNvPicPr>
+          <p:nvPr>
+            <p:ph idx="1"/>
+          </p:nvPr>
+        </p:nvPicPr>
+        <p:blipFill>
+          <a:blip r:embed="rId2"/>
+          <a:stretch>
+            <a:fillRect/>
+          </a:stretch>
+        </p:blipFill>
+        <p:spPr>
+          <a:xfrm>
+            <a:off x="7222455" y="1619779"/>
+            <a:ext cx="4587996" cy="4873096"/>
+          </a:xfrm>
+        </p:spPr>
+      </p:pic>
+      <p:sp>
+        <p:nvSpPr>
+          <p:cNvPr id="7" name="TextBox 6">
+            <a:extLst>
+              <a:ext uri="{FF2B5EF4-FFF2-40B4-BE49-F238E27FC236}">
+                <a16:creationId xmlns:a16="http://schemas.microsoft.com/office/drawing/2014/main" id="{D0FBDFCC-F6BF-43DC-8ED4-9500ADFC51D9}"/>
+              </a:ext>
+            </a:extLst>
+          </p:cNvPr>
+          <p:cNvSpPr txBox="1"/>
+          <p:nvPr/>
+        </p:nvSpPr>
+        <p:spPr>
+          <a:xfrm>
+            <a:off x="838200" y="1972418"/>
+            <a:ext cx="5969000" cy="1477328"/>
+          </a:xfrm>
+          <a:prstGeom prst="rect">
+            <a:avLst/>
+          </a:prstGeom>
+          <a:noFill/>
+        </p:spPr>
+        <p:txBody>
+          <a:bodyPr wrap="square" rtlCol="0">
+            <a:spAutoFit/>
+          </a:bodyPr>
+          <a:lstStyle/>
+          <a:p>
+            <a:pPr marL="342900" indent="-342900">
+              <a:buFont typeface="+mj-lt"/>
+              <a:buAutoNum type="arabicPeriod"/>
+            </a:pPr>
+            <a:r>
+              <a:rPr lang="en-US" dirty="0"/>
+              <a:t>Models that train in the future </a:t>
+            </a:r>
+            <a:r>
+              <a:rPr lang="en-US" b="1" dirty="0">
+                <a:solidFill>
+                  <a:srgbClr val="FF0000"/>
+                </a:solidFill>
+              </a:rPr>
+              <a:t>underestimate the error (sign of leakage!)</a:t>
+            </a:r>
+            <a:r>
+              <a:rPr lang="en-US" b="1" dirty="0"/>
+              <a:t>;</a:t>
+            </a:r>
+          </a:p>
+          <a:p>
+            <a:pPr marL="342900" indent="-342900">
+              <a:buFont typeface="+mj-lt"/>
+              <a:buAutoNum type="arabicPeriod"/>
+            </a:pPr>
+            <a:r>
+              <a:rPr lang="en-US" dirty="0"/>
+              <a:t>The </a:t>
+            </a:r>
+            <a:r>
+              <a:rPr lang="en-US" b="1" dirty="0"/>
+              <a:t>most accurate models are the ones that use the past </a:t>
+            </a:r>
+            <a:r>
+              <a:rPr lang="en-US" dirty="0"/>
+              <a:t>to train.</a:t>
+            </a:r>
+            <a:endParaRPr lang="en-US" b="1" dirty="0"/>
+          </a:p>
+          <a:p>
+            <a:pPr marL="285750" indent="-285750">
+              <a:buFont typeface="Arial" panose="020B0604020202020204" pitchFamily="34" charset="0"/>
+              <a:buChar char="•"/>
+            </a:pPr>
+            <a:endParaRPr lang="en-US" dirty="0"/>
+          </a:p>
+        </p:txBody>
+      </p:sp>
+      <p:sp>
+        <p:nvSpPr>
+          <p:cNvPr id="12" name="Rectangle: Rounded Corners 11">
+            <a:extLst>
+              <a:ext uri="{FF2B5EF4-FFF2-40B4-BE49-F238E27FC236}">
+                <a16:creationId xmlns:a16="http://schemas.microsoft.com/office/drawing/2014/main" id="{611EB5B8-E52A-4148-BE95-DCE18CD40995}"/>
+              </a:ext>
+            </a:extLst>
+          </p:cNvPr>
+          <p:cNvSpPr/>
+          <p:nvPr/>
+        </p:nvSpPr>
+        <p:spPr>
+          <a:xfrm>
+            <a:off x="702733" y="4292600"/>
+            <a:ext cx="6925571" cy="2075391"/>
+          </a:xfrm>
+          <a:prstGeom prst="roundRect">
+            <a:avLst>
+              <a:gd name="adj" fmla="val 4208"/>
+            </a:avLst>
+          </a:prstGeom>
+          <a:solidFill>
+            <a:schemeClr val="bg1"/>
+          </a:solidFill>
+          <a:ln w="28575">
+            <a:solidFill>
+              <a:schemeClr val="bg1">
+                <a:lumMod val="50000"/>
+              </a:schemeClr>
+            </a:solidFill>
+          </a:ln>
+        </p:spPr>
+        <p:style>
+          <a:lnRef idx="2">
+            <a:schemeClr val="accent1">
+              <a:shade val="50000"/>
+            </a:schemeClr>
+          </a:lnRef>
+          <a:fillRef idx="1">
+            <a:schemeClr val="accent1"/>
+          </a:fillRef>
+          <a:effectRef idx="0">
+            <a:schemeClr val="accent1"/>
+          </a:effectRef>
+          <a:fontRef idx="minor">
+            <a:schemeClr val="lt1"/>
+          </a:fontRef>
+        </p:style>
+        <p:txBody>
+          <a:bodyPr rtlCol="0" anchor="ctr"/>
+          <a:lstStyle/>
+          <a:p>
+            <a:pPr algn="ctr"/>
+            <a:endParaRPr lang="en-US"/>
+          </a:p>
+        </p:txBody>
+      </p:sp>
+      <p:pic>
+        <p:nvPicPr>
+          <p:cNvPr id="11" name="Picture 10">
+            <a:extLst>
+              <a:ext uri="{FF2B5EF4-FFF2-40B4-BE49-F238E27FC236}">
+                <a16:creationId xmlns:a16="http://schemas.microsoft.com/office/drawing/2014/main" id="{03D77397-5637-4FC0-A563-1195357FFDAD}"/>
+              </a:ext>
+            </a:extLst>
+          </p:cNvPr>
+          <p:cNvPicPr>
+            <a:picLocks noChangeAspect="1"/>
+          </p:cNvPicPr>
+          <p:nvPr/>
+        </p:nvPicPr>
+        <p:blipFill>
+          <a:blip r:embed="rId3"/>
+          <a:stretch>
+            <a:fillRect/>
+          </a:stretch>
+        </p:blipFill>
+        <p:spPr>
+          <a:xfrm>
+            <a:off x="1109355" y="4368800"/>
+            <a:ext cx="6341147" cy="1934982"/>
+          </a:xfrm>
+          <a:prstGeom prst="rect">
+            <a:avLst/>
+          </a:prstGeom>
+        </p:spPr>
+      </p:pic>
+      <p:sp>
+        <p:nvSpPr>
+          <p:cNvPr id="13" name="Rectangle 12">
+            <a:extLst>
+              <a:ext uri="{FF2B5EF4-FFF2-40B4-BE49-F238E27FC236}">
+                <a16:creationId xmlns:a16="http://schemas.microsoft.com/office/drawing/2014/main" id="{D62E31C0-B72C-4CC7-A4E4-51111A85B8B0}"/>
+              </a:ext>
+            </a:extLst>
+          </p:cNvPr>
+          <p:cNvSpPr/>
+          <p:nvPr/>
+        </p:nvSpPr>
+        <p:spPr>
+          <a:xfrm>
+            <a:off x="10188277" y="2173856"/>
+            <a:ext cx="404961" cy="4252343"/>
+          </a:xfrm>
+          <a:prstGeom prst="rect">
+            <a:avLst/>
+          </a:prstGeom>
+          <a:noFill/>
+          <a:ln w="38100">
+            <a:solidFill>
+              <a:srgbClr val="FF0000"/>
+            </a:solidFill>
+          </a:ln>
+        </p:spPr>
+        <p:style>
+          <a:lnRef idx="2">
+            <a:schemeClr val="accent1">
+              <a:shade val="50000"/>
+            </a:schemeClr>
+          </a:lnRef>
+          <a:fillRef idx="1">
+            <a:schemeClr val="accent1"/>
+          </a:fillRef>
+          <a:effectRef idx="0">
+            <a:schemeClr val="accent1"/>
+          </a:effectRef>
+          <a:fontRef idx="minor">
+            <a:schemeClr val="lt1"/>
+          </a:fontRef>
+        </p:style>
+        <p:txBody>
+          <a:bodyPr rtlCol="0" anchor="ctr"/>
+          <a:lstStyle/>
+          <a:p>
+            <a:pPr algn="ctr"/>
+            <a:endParaRPr lang="en-US"/>
+          </a:p>
+        </p:txBody>
+      </p:sp>
+      <p:sp>
+        <p:nvSpPr>
+          <p:cNvPr id="21" name="Rectangle 20">
+            <a:extLst>
+              <a:ext uri="{FF2B5EF4-FFF2-40B4-BE49-F238E27FC236}">
+                <a16:creationId xmlns:a16="http://schemas.microsoft.com/office/drawing/2014/main" id="{A777E874-065B-4A13-A8BD-ED162779F48A}"/>
+              </a:ext>
+            </a:extLst>
+          </p:cNvPr>
+          <p:cNvSpPr/>
+          <p:nvPr/>
+        </p:nvSpPr>
+        <p:spPr>
+          <a:xfrm>
+            <a:off x="8502886" y="2173856"/>
+            <a:ext cx="404961" cy="4252343"/>
+          </a:xfrm>
+          <a:prstGeom prst="rect">
+            <a:avLst/>
+          </a:prstGeom>
+          <a:noFill/>
+          <a:ln w="38100">
+            <a:solidFill>
+              <a:srgbClr val="FF0000"/>
+            </a:solidFill>
+          </a:ln>
+        </p:spPr>
+        <p:style>
+          <a:lnRef idx="2">
+            <a:schemeClr val="accent1">
+              <a:shade val="50000"/>
+            </a:schemeClr>
+          </a:lnRef>
+          <a:fillRef idx="1">
+            <a:schemeClr val="accent1"/>
+          </a:fillRef>
+          <a:effectRef idx="0">
+            <a:schemeClr val="accent1"/>
+          </a:effectRef>
+          <a:fontRef idx="minor">
+            <a:schemeClr val="lt1"/>
+          </a:fontRef>
+        </p:style>
+        <p:txBody>
+          <a:bodyPr rtlCol="0" anchor="ctr"/>
+          <a:lstStyle/>
+          <a:p>
+            <a:pPr algn="ctr"/>
+            <a:endParaRPr lang="en-US"/>
+          </a:p>
+        </p:txBody>
+      </p:sp>
+    </p:spTree>
+    <p:extLst>
+      <p:ext uri="{BB962C8B-B14F-4D97-AF65-F5344CB8AC3E}">
+        <p14:creationId xmlns:p14="http://schemas.microsoft.com/office/powerpoint/2010/main" val="3313615362"/>
+      </p:ext>
+    </p:extLst>
+  </p:cSld>
+  <p:clrMapOvr>
+    <a:masterClrMapping/>
+  </p:clrMapOvr>
+</p:sld>
+</file>
+
+<file path=ppt/slides/slide12.xml><?xml version="1.0" encoding="utf-8"?>
+<p:sld xmlns:a="http://schemas.openxmlformats.org/drawingml/2006/main" xmlns:r="http://schemas.openxmlformats.org/officeDocument/2006/relationships" xmlns:p="http://schemas.openxmlformats.org/presentationml/2006/main">
+  <p:cSld>
+    <p:spTree>
+      <p:nvGrpSpPr>
+        <p:cNvPr id="1" name=""/>
+        <p:cNvGrpSpPr/>
+        <p:nvPr/>
+      </p:nvGrpSpPr>
+      <p:grpSpPr>
+        <a:xfrm>
+          <a:off x="0" y="0"/>
+          <a:ext cx="0" cy="0"/>
+          <a:chOff x="0" y="0"/>
+          <a:chExt cx="0" cy="0"/>
+        </a:xfrm>
+      </p:grpSpPr>
+      <p:sp>
+        <p:nvSpPr>
+          <p:cNvPr id="2" name="Title 1">
+            <a:extLst>
+              <a:ext uri="{FF2B5EF4-FFF2-40B4-BE49-F238E27FC236}">
+                <a16:creationId xmlns:a16="http://schemas.microsoft.com/office/drawing/2014/main" id="{035535A7-2050-475D-94CA-7B0B00D4DD72}"/>
+              </a:ext>
+            </a:extLst>
+          </p:cNvPr>
+          <p:cNvSpPr>
+            <a:spLocks noGrp="1"/>
+          </p:cNvSpPr>
+          <p:nvPr>
+            <p:ph type="title"/>
+          </p:nvPr>
+        </p:nvSpPr>
+        <p:spPr/>
+        <p:txBody>
+          <a:bodyPr/>
+          <a:lstStyle/>
+          <a:p>
+            <a:r>
+              <a:rPr lang="en-US" dirty="0"/>
+              <a:t>Should We Train In Older Data?</a:t>
+            </a:r>
+          </a:p>
+        </p:txBody>
+      </p:sp>
+      <p:sp>
+        <p:nvSpPr>
+          <p:cNvPr id="7" name="TextBox 6">
+            <a:extLst>
+              <a:ext uri="{FF2B5EF4-FFF2-40B4-BE49-F238E27FC236}">
+                <a16:creationId xmlns:a16="http://schemas.microsoft.com/office/drawing/2014/main" id="{D0FBDFCC-F6BF-43DC-8ED4-9500ADFC51D9}"/>
+              </a:ext>
+            </a:extLst>
+          </p:cNvPr>
+          <p:cNvSpPr txBox="1"/>
+          <p:nvPr/>
+        </p:nvSpPr>
+        <p:spPr>
+          <a:xfrm>
+            <a:off x="838200" y="1972418"/>
+            <a:ext cx="5969000" cy="1477328"/>
+          </a:xfrm>
+          <a:prstGeom prst="rect">
+            <a:avLst/>
+          </a:prstGeom>
+          <a:noFill/>
+        </p:spPr>
+        <p:txBody>
+          <a:bodyPr wrap="square" rtlCol="0">
+            <a:spAutoFit/>
+          </a:bodyPr>
+          <a:lstStyle/>
+          <a:p>
+            <a:pPr marL="342900" indent="-342900">
+              <a:buFont typeface="+mj-lt"/>
+              <a:buAutoNum type="arabicPeriod"/>
+            </a:pPr>
+            <a:r>
+              <a:rPr lang="en-US" dirty="0"/>
+              <a:t>Models that train in the future </a:t>
+            </a:r>
+            <a:r>
+              <a:rPr lang="en-US" b="1" dirty="0"/>
+              <a:t>underestimate the error (sign of leakage!);</a:t>
+            </a:r>
+          </a:p>
+          <a:p>
+            <a:pPr marL="342900" indent="-342900">
+              <a:buFont typeface="+mj-lt"/>
+              <a:buAutoNum type="arabicPeriod"/>
+            </a:pPr>
+            <a:r>
+              <a:rPr lang="en-US" dirty="0"/>
+              <a:t>The </a:t>
+            </a:r>
+            <a:r>
+              <a:rPr lang="en-US" b="1" dirty="0"/>
+              <a:t>most accurate models are the ones that use the past </a:t>
+            </a:r>
+            <a:r>
+              <a:rPr lang="en-US" dirty="0"/>
+              <a:t>to train.</a:t>
+            </a:r>
+            <a:endParaRPr lang="en-US" b="1" dirty="0"/>
+          </a:p>
+          <a:p>
+            <a:pPr marL="285750" indent="-285750">
+              <a:buFont typeface="Arial" panose="020B0604020202020204" pitchFamily="34" charset="0"/>
+              <a:buChar char="•"/>
+            </a:pPr>
+            <a:endParaRPr lang="en-US" dirty="0"/>
+          </a:p>
+        </p:txBody>
+      </p:sp>
+      <p:sp>
+        <p:nvSpPr>
+          <p:cNvPr id="12" name="Rectangle: Rounded Corners 11">
+            <a:extLst>
+              <a:ext uri="{FF2B5EF4-FFF2-40B4-BE49-F238E27FC236}">
+                <a16:creationId xmlns:a16="http://schemas.microsoft.com/office/drawing/2014/main" id="{611EB5B8-E52A-4148-BE95-DCE18CD40995}"/>
+              </a:ext>
+            </a:extLst>
+          </p:cNvPr>
+          <p:cNvSpPr/>
+          <p:nvPr/>
+        </p:nvSpPr>
+        <p:spPr>
+          <a:xfrm>
+            <a:off x="702733" y="4292600"/>
+            <a:ext cx="6925571" cy="2075391"/>
+          </a:xfrm>
+          <a:prstGeom prst="roundRect">
+            <a:avLst>
+              <a:gd name="adj" fmla="val 4208"/>
+            </a:avLst>
+          </a:prstGeom>
+          <a:solidFill>
+            <a:schemeClr val="bg1"/>
+          </a:solidFill>
+          <a:ln w="28575">
+            <a:solidFill>
+              <a:schemeClr val="bg1">
+                <a:lumMod val="50000"/>
+              </a:schemeClr>
+            </a:solidFill>
+          </a:ln>
+        </p:spPr>
+        <p:style>
+          <a:lnRef idx="2">
+            <a:schemeClr val="accent1">
+              <a:shade val="50000"/>
+            </a:schemeClr>
+          </a:lnRef>
+          <a:fillRef idx="1">
+            <a:schemeClr val="accent1"/>
+          </a:fillRef>
+          <a:effectRef idx="0">
+            <a:schemeClr val="accent1"/>
+          </a:effectRef>
+          <a:fontRef idx="minor">
+            <a:schemeClr val="lt1"/>
+          </a:fontRef>
+        </p:style>
+        <p:txBody>
+          <a:bodyPr rtlCol="0" anchor="ctr"/>
+          <a:lstStyle/>
+          <a:p>
+            <a:pPr algn="ctr"/>
+            <a:endParaRPr lang="en-US"/>
+          </a:p>
+        </p:txBody>
+      </p:sp>
+      <p:pic>
+        <p:nvPicPr>
+          <p:cNvPr id="11" name="Picture 10">
+            <a:extLst>
+              <a:ext uri="{FF2B5EF4-FFF2-40B4-BE49-F238E27FC236}">
+                <a16:creationId xmlns:a16="http://schemas.microsoft.com/office/drawing/2014/main" id="{03D77397-5637-4FC0-A563-1195357FFDAD}"/>
+              </a:ext>
+            </a:extLst>
+          </p:cNvPr>
+          <p:cNvPicPr>
+            <a:picLocks noChangeAspect="1"/>
+          </p:cNvPicPr>
+          <p:nvPr/>
+        </p:nvPicPr>
+        <p:blipFill>
+          <a:blip r:embed="rId2"/>
+          <a:stretch>
+            <a:fillRect/>
+          </a:stretch>
+        </p:blipFill>
+        <p:spPr>
+          <a:xfrm>
+            <a:off x="1109355" y="4368800"/>
+            <a:ext cx="6341147" cy="1934982"/>
+          </a:xfrm>
+          <a:prstGeom prst="rect">
+            <a:avLst/>
+          </a:prstGeom>
+        </p:spPr>
+      </p:pic>
+      <p:pic>
+        <p:nvPicPr>
+          <p:cNvPr id="10" name="Picture 9">
+            <a:extLst>
+              <a:ext uri="{FF2B5EF4-FFF2-40B4-BE49-F238E27FC236}">
+                <a16:creationId xmlns:a16="http://schemas.microsoft.com/office/drawing/2014/main" id="{89F60674-5E57-4DAB-B387-3957B1CB99A9}"/>
+              </a:ext>
+            </a:extLst>
+          </p:cNvPr>
+          <p:cNvPicPr>
+            <a:picLocks noChangeAspect="1"/>
+          </p:cNvPicPr>
+          <p:nvPr/>
+        </p:nvPicPr>
+        <p:blipFill>
+          <a:blip r:embed="rId3"/>
+          <a:stretch>
+            <a:fillRect/>
+          </a:stretch>
+        </p:blipFill>
+        <p:spPr>
+          <a:xfrm>
+            <a:off x="7628304" y="1735606"/>
+            <a:ext cx="4361368" cy="4632385"/>
+          </a:xfrm>
+          <a:prstGeom prst="rect">
+            <a:avLst/>
+          </a:prstGeom>
+        </p:spPr>
+      </p:pic>
+    </p:spTree>
+    <p:extLst>
+      <p:ext uri="{BB962C8B-B14F-4D97-AF65-F5344CB8AC3E}">
+        <p14:creationId xmlns:p14="http://schemas.microsoft.com/office/powerpoint/2010/main" val="193239459"/>
       </p:ext>
     </p:extLst>
   </p:cSld>
@@ -3560,34 +4263,25 @@
           </a:bodyPr>
           <a:lstStyle/>
           <a:p>
-            <a:pPr marL="0" indent="0">
-              <a:buNone/>
-            </a:pPr>
-            <a:r>
-              <a:rPr lang="en-US" sz="2400" u="sng" dirty="0" err="1"/>
-              <a:t>Experiências</a:t>
+            <a:r>
+              <a:rPr lang="en-US" sz="2400" dirty="0" err="1"/>
+              <a:t>Processamento</a:t>
             </a:r>
             <a:r>
               <a:rPr lang="en-US" sz="2400" dirty="0"/>
-              <a:t>: </a:t>
-            </a:r>
-          </a:p>
-          <a:p>
+              <a:t> de </a:t>
+            </a:r>
+            <a:r>
+              <a:rPr lang="en-US" sz="2400" dirty="0" err="1"/>
+              <a:t>novos</a:t>
+            </a:r>
             <a:r>
               <a:rPr lang="en-US" sz="2400" dirty="0"/>
-              <a:t>Re-</a:t>
+              <a:t> </a:t>
             </a:r>
             <a:r>
               <a:rPr lang="en-US" sz="2400" dirty="0" err="1"/>
-              <a:t>começo</a:t>
-            </a:r>
-            <a:r>
-              <a:rPr lang="en-US" sz="2400" dirty="0"/>
-              <a:t> da </a:t>
-            </a:r>
-            <a:r>
-              <a:rPr lang="en-US" sz="2400" dirty="0" err="1"/>
-              <a:t>escrita</a:t>
+              <a:t>resultados</a:t>
             </a:r>
             <a:r>
               <a:rPr lang="en-US" sz="2400" dirty="0"/>
@@ -3595,98 +4289,7 @@
             </a:r>
           </a:p>
           <a:p>
-            <a:r>
-              <a:rPr lang="en-US" sz="2400" dirty="0" err="1"/>
-              <a:t>Tentativa</a:t>
-            </a:r>
-            <a:r>
-              <a:rPr lang="en-US" sz="2400" dirty="0"/>
-              <a:t> (</a:t>
-            </a:r>
-            <a:r>
-              <a:rPr lang="en-US" sz="2400" dirty="0" err="1"/>
-              <a:t>falhada</a:t>
-            </a:r>
-            <a:r>
-              <a:rPr lang="en-US" sz="2400" dirty="0"/>
-              <a:t>) de </a:t>
-            </a:r>
-            <a:r>
-              <a:rPr lang="en-US" sz="2400" dirty="0" err="1"/>
-              <a:t>uso</a:t>
-            </a:r>
-            <a:r>
-              <a:rPr lang="en-US" sz="2400" dirty="0"/>
-              <a:t> de </a:t>
-            </a:r>
-            <a:r>
-              <a:rPr lang="en-US" sz="2400" dirty="0" err="1"/>
-              <a:t>outra</a:t>
-            </a:r>
-            <a:r>
-              <a:rPr lang="en-US" sz="2400" dirty="0"/>
-              <a:t> package para a LSTM;</a:t>
-            </a:r>
-          </a:p>
-          <a:p>
-            <a:r>
-              <a:rPr lang="en-US" sz="2400" dirty="0" err="1"/>
-              <a:t>Redefinição</a:t>
-            </a:r>
-            <a:r>
-              <a:rPr lang="en-US" sz="2400" dirty="0"/>
-              <a:t> de material para </a:t>
-            </a:r>
-            <a:r>
-              <a:rPr lang="en-US" sz="2400" dirty="0" err="1"/>
-              <a:t>experiências</a:t>
-            </a:r>
-            <a:r>
-              <a:rPr lang="en-US" sz="2400" dirty="0"/>
-              <a:t> “</a:t>
-            </a:r>
-            <a:r>
-              <a:rPr lang="en-US" sz="2400" dirty="0" err="1"/>
-              <a:t>específicas</a:t>
-            </a:r>
-            <a:r>
-              <a:rPr lang="en-US" sz="2400" dirty="0"/>
-              <a:t>”</a:t>
-            </a:r>
-          </a:p>
-          <a:p>
-            <a:r>
-              <a:rPr lang="en-US" sz="2400" dirty="0" err="1"/>
-              <a:t>Já</a:t>
-            </a:r>
-            <a:r>
-              <a:rPr lang="en-US" sz="2400" dirty="0"/>
-              <a:t> </a:t>
-            </a:r>
-            <a:r>
-              <a:rPr lang="en-US" sz="2400" dirty="0" err="1"/>
-              <a:t>temos</a:t>
-            </a:r>
-            <a:r>
-              <a:rPr lang="en-US" sz="2400" dirty="0"/>
-              <a:t> </a:t>
-            </a:r>
-            <a:r>
-              <a:rPr lang="en-US" sz="2400" dirty="0" err="1"/>
-              <a:t>alguns</a:t>
-            </a:r>
-            <a:r>
-              <a:rPr lang="en-US" sz="2400" dirty="0"/>
-              <a:t> </a:t>
-            </a:r>
-            <a:r>
-              <a:rPr lang="en-US" sz="2400" dirty="0" err="1"/>
-              <a:t>resultados</a:t>
-            </a:r>
-            <a:r>
-              <a:rPr lang="en-US" sz="2400" dirty="0"/>
-              <a:t>!</a:t>
-            </a:r>
+            <a:endParaRPr lang="en-US" sz="2400" dirty="0"/>
           </a:p>
         </p:txBody>
       </p:sp>
@@ -5062,6 +5665,1609 @@
 </p:sld>
 </file>
 
+<file path=ppt/slides/slide6.xml><?xml version="1.0" encoding="utf-8"?>
+<p:sld xmlns:a="http://schemas.openxmlformats.org/drawingml/2006/main" xmlns:r="http://schemas.openxmlformats.org/officeDocument/2006/relationships" xmlns:p="http://schemas.openxmlformats.org/presentationml/2006/main">
+  <p:cSld>
+    <p:spTree>
+      <p:nvGrpSpPr>
+        <p:cNvPr id="1" name=""/>
+        <p:cNvGrpSpPr/>
+        <p:nvPr/>
+      </p:nvGrpSpPr>
+      <p:grpSpPr>
+        <a:xfrm>
+          <a:off x="0" y="0"/>
+          <a:ext cx="0" cy="0"/>
+          <a:chOff x="0" y="0"/>
+          <a:chExt cx="0" cy="0"/>
+        </a:xfrm>
+      </p:grpSpPr>
+      <p:sp>
+        <p:nvSpPr>
+          <p:cNvPr id="2" name="Title 1">
+            <a:extLst>
+              <a:ext uri="{FF2B5EF4-FFF2-40B4-BE49-F238E27FC236}">
+                <a16:creationId xmlns:a16="http://schemas.microsoft.com/office/drawing/2014/main" id="{2A072743-34AD-4AF6-842F-F8255055C9D3}"/>
+              </a:ext>
+            </a:extLst>
+          </p:cNvPr>
+          <p:cNvSpPr>
+            <a:spLocks noGrp="1"/>
+          </p:cNvSpPr>
+          <p:nvPr>
+            <p:ph type="title"/>
+          </p:nvPr>
+        </p:nvSpPr>
+        <p:spPr/>
+        <p:txBody>
+          <a:bodyPr/>
+          <a:lstStyle/>
+          <a:p>
+            <a:r>
+              <a:rPr lang="en-US" dirty="0"/>
+              <a:t>Results</a:t>
+            </a:r>
+          </a:p>
+        </p:txBody>
+      </p:sp>
+      <p:sp>
+        <p:nvSpPr>
+          <p:cNvPr id="3" name="Text Placeholder 2">
+            <a:extLst>
+              <a:ext uri="{FF2B5EF4-FFF2-40B4-BE49-F238E27FC236}">
+                <a16:creationId xmlns:a16="http://schemas.microsoft.com/office/drawing/2014/main" id="{4A8E621A-E40E-4C16-BA68-52F25D530EB9}"/>
+              </a:ext>
+            </a:extLst>
+          </p:cNvPr>
+          <p:cNvSpPr>
+            <a:spLocks noGrp="1"/>
+          </p:cNvSpPr>
+          <p:nvPr>
+            <p:ph type="body" idx="1"/>
+          </p:nvPr>
+        </p:nvSpPr>
+        <p:spPr/>
+        <p:txBody>
+          <a:bodyPr/>
+          <a:lstStyle/>
+          <a:p>
+            <a:endParaRPr lang="en-US"/>
+          </a:p>
+        </p:txBody>
+      </p:sp>
+    </p:spTree>
+    <p:extLst>
+      <p:ext uri="{BB962C8B-B14F-4D97-AF65-F5344CB8AC3E}">
+        <p14:creationId xmlns:p14="http://schemas.microsoft.com/office/powerpoint/2010/main" val="2544138041"/>
+      </p:ext>
+    </p:extLst>
+  </p:cSld>
+  <p:clrMapOvr>
+    <a:masterClrMapping/>
+  </p:clrMapOvr>
+</p:sld>
+</file>
+
+<file path=ppt/slides/slide7.xml><?xml version="1.0" encoding="utf-8"?>
+<p:sld xmlns:a="http://schemas.openxmlformats.org/drawingml/2006/main" xmlns:r="http://schemas.openxmlformats.org/officeDocument/2006/relationships" xmlns:p="http://schemas.openxmlformats.org/presentationml/2006/main">
+  <p:cSld>
+    <p:spTree>
+      <p:nvGrpSpPr>
+        <p:cNvPr id="1" name=""/>
+        <p:cNvGrpSpPr/>
+        <p:nvPr/>
+      </p:nvGrpSpPr>
+      <p:grpSpPr>
+        <a:xfrm>
+          <a:off x="0" y="0"/>
+          <a:ext cx="0" cy="0"/>
+          <a:chOff x="0" y="0"/>
+          <a:chExt cx="0" cy="0"/>
+        </a:xfrm>
+      </p:grpSpPr>
+      <p:sp>
+        <p:nvSpPr>
+          <p:cNvPr id="2" name="Title 1">
+            <a:extLst>
+              <a:ext uri="{FF2B5EF4-FFF2-40B4-BE49-F238E27FC236}">
+                <a16:creationId xmlns:a16="http://schemas.microsoft.com/office/drawing/2014/main" id="{3CD693ED-A2B6-498F-9C1A-C4A2CF235623}"/>
+              </a:ext>
+            </a:extLst>
+          </p:cNvPr>
+          <p:cNvSpPr>
+            <a:spLocks noGrp="1"/>
+          </p:cNvSpPr>
+          <p:nvPr>
+            <p:ph type="title"/>
+          </p:nvPr>
+        </p:nvSpPr>
+        <p:spPr/>
+        <p:txBody>
+          <a:bodyPr/>
+          <a:lstStyle/>
+          <a:p>
+            <a:r>
+              <a:rPr lang="en-US" dirty="0"/>
+              <a:t>Main Results</a:t>
+            </a:r>
+          </a:p>
+        </p:txBody>
+      </p:sp>
+      <p:sp>
+        <p:nvSpPr>
+          <p:cNvPr id="3" name="Content Placeholder 2">
+            <a:extLst>
+              <a:ext uri="{FF2B5EF4-FFF2-40B4-BE49-F238E27FC236}">
+                <a16:creationId xmlns:a16="http://schemas.microsoft.com/office/drawing/2014/main" id="{5F5D42F4-32F1-48D9-B927-681AF38E645F}"/>
+              </a:ext>
+            </a:extLst>
+          </p:cNvPr>
+          <p:cNvSpPr>
+            <a:spLocks noGrp="1"/>
+          </p:cNvSpPr>
+          <p:nvPr>
+            <p:ph idx="1"/>
+          </p:nvPr>
+        </p:nvSpPr>
+        <p:spPr/>
+        <p:txBody>
+          <a:bodyPr>
+            <a:normAutofit/>
+          </a:bodyPr>
+          <a:lstStyle/>
+          <a:p>
+            <a:r>
+              <a:rPr lang="en-US" sz="2000" dirty="0"/>
+              <a:t>Weighted version of Block-CV </a:t>
+            </a:r>
+            <a:r>
+              <a:rPr lang="en-US" sz="2000" b="1" dirty="0"/>
+              <a:t>is better </a:t>
+            </a:r>
+            <a:r>
+              <a:rPr lang="en-US" sz="2000" dirty="0"/>
+              <a:t>than the original (less error and lower variance)</a:t>
+            </a:r>
+          </a:p>
+          <a:p>
+            <a:r>
+              <a:rPr lang="en-US" sz="2000" dirty="0"/>
+              <a:t>Weighted version of Growing Window </a:t>
+            </a:r>
+            <a:r>
+              <a:rPr lang="en-US" sz="2000" b="1" dirty="0"/>
+              <a:t>is better </a:t>
+            </a:r>
+            <a:r>
+              <a:rPr lang="en-US" sz="2000" dirty="0"/>
+              <a:t>than the original (less error and lower variance)</a:t>
+            </a:r>
+          </a:p>
+          <a:p>
+            <a:r>
+              <a:rPr lang="en-US" sz="2000" dirty="0"/>
+              <a:t>Weighted version of Rolling Window </a:t>
+            </a:r>
+            <a:r>
+              <a:rPr lang="en-US" sz="2000" b="1" dirty="0"/>
+              <a:t>is worse </a:t>
+            </a:r>
+            <a:r>
+              <a:rPr lang="en-US" sz="2000" dirty="0"/>
+              <a:t>than the original</a:t>
+            </a:r>
+          </a:p>
+          <a:p>
+            <a:endParaRPr lang="en-US" sz="2000" dirty="0"/>
+          </a:p>
+          <a:p>
+            <a:endParaRPr lang="en-US" sz="2000" dirty="0"/>
+          </a:p>
+          <a:p>
+            <a:endParaRPr lang="en-US" sz="2000" dirty="0"/>
+          </a:p>
+          <a:p>
+            <a:endParaRPr lang="en-US" sz="2000" dirty="0"/>
+          </a:p>
+          <a:p>
+            <a:endParaRPr lang="en-US" sz="2000" dirty="0"/>
+          </a:p>
+        </p:txBody>
+      </p:sp>
+      <p:sp>
+        <p:nvSpPr>
+          <p:cNvPr id="4" name="TextBox 3">
+            <a:extLst>
+              <a:ext uri="{FF2B5EF4-FFF2-40B4-BE49-F238E27FC236}">
+                <a16:creationId xmlns:a16="http://schemas.microsoft.com/office/drawing/2014/main" id="{B267A4A9-980C-4866-B7C2-9208AFFE5B52}"/>
+              </a:ext>
+            </a:extLst>
+          </p:cNvPr>
+          <p:cNvSpPr txBox="1"/>
+          <p:nvPr/>
+        </p:nvSpPr>
+        <p:spPr>
+          <a:xfrm>
+            <a:off x="7289800" y="6053666"/>
+            <a:ext cx="4256422" cy="369332"/>
+          </a:xfrm>
+          <a:prstGeom prst="rect">
+            <a:avLst/>
+          </a:prstGeom>
+          <a:noFill/>
+        </p:spPr>
+        <p:txBody>
+          <a:bodyPr wrap="none" rtlCol="0">
+            <a:spAutoFit/>
+          </a:bodyPr>
+          <a:lstStyle/>
+          <a:p>
+            <a:r>
+              <a:rPr lang="en-US" dirty="0"/>
+              <a:t>These results are nowhere in the literature</a:t>
+            </a:r>
+          </a:p>
+        </p:txBody>
+      </p:sp>
+      <p:grpSp>
+        <p:nvGrpSpPr>
+          <p:cNvPr id="9" name="Group 8">
+            <a:extLst>
+              <a:ext uri="{FF2B5EF4-FFF2-40B4-BE49-F238E27FC236}">
+                <a16:creationId xmlns:a16="http://schemas.microsoft.com/office/drawing/2014/main" id="{E2B00F31-641F-44C4-A0BF-EF810811F371}"/>
+              </a:ext>
+            </a:extLst>
+          </p:cNvPr>
+          <p:cNvGrpSpPr/>
+          <p:nvPr/>
+        </p:nvGrpSpPr>
+        <p:grpSpPr>
+          <a:xfrm>
+            <a:off x="6857426" y="6053668"/>
+            <a:ext cx="457200" cy="365760"/>
+            <a:chOff x="3546956" y="5393267"/>
+            <a:chExt cx="669064" cy="457200"/>
+          </a:xfrm>
+        </p:grpSpPr>
+        <p:pic>
+          <p:nvPicPr>
+            <p:cNvPr id="7" name="Graphic 6" descr="Exclamation mark with solid fill">
+              <a:extLst>
+                <a:ext uri="{FF2B5EF4-FFF2-40B4-BE49-F238E27FC236}">
+                  <a16:creationId xmlns:a16="http://schemas.microsoft.com/office/drawing/2014/main" id="{0E46AC3B-243E-44E2-AC56-9CC8C17C9C71}"/>
+                </a:ext>
+              </a:extLst>
+            </p:cNvPr>
+            <p:cNvPicPr>
+              <a:picLocks noChangeAspect="1"/>
+            </p:cNvPicPr>
+            <p:nvPr/>
+          </p:nvPicPr>
+          <p:blipFill>
+            <a:blip r:embed="rId2">
+              <a:extLst>
+                <a:ext uri="{28A0092B-C50C-407E-A947-70E740481C1C}">
+                  <a14:useLocalDpi xmlns:a14="http://schemas.microsoft.com/office/drawing/2010/main" val="0"/>
+                </a:ext>
+                <a:ext uri="{96DAC541-7B7A-43D3-8B79-37D633B846F1}">
+                  <asvg:svgBlip xmlns:asvg="http://schemas.microsoft.com/office/drawing/2016/SVG/main" r:embed="rId3"/>
+                </a:ext>
+              </a:extLst>
+            </a:blip>
+            <a:stretch>
+              <a:fillRect/>
+            </a:stretch>
+          </p:blipFill>
+          <p:spPr>
+            <a:xfrm>
+              <a:off x="3758820" y="5393267"/>
+              <a:ext cx="457200" cy="457200"/>
+            </a:xfrm>
+            <a:prstGeom prst="rect">
+              <a:avLst/>
+            </a:prstGeom>
+          </p:spPr>
+        </p:pic>
+        <p:pic>
+          <p:nvPicPr>
+            <p:cNvPr id="8" name="Graphic 7" descr="Exclamation mark with solid fill">
+              <a:extLst>
+                <a:ext uri="{FF2B5EF4-FFF2-40B4-BE49-F238E27FC236}">
+                  <a16:creationId xmlns:a16="http://schemas.microsoft.com/office/drawing/2014/main" id="{E2E49FE5-86B7-42C4-9E7B-CE08EF338C14}"/>
+                </a:ext>
+              </a:extLst>
+            </p:cNvPr>
+            <p:cNvPicPr>
+              <a:picLocks noChangeAspect="1"/>
+            </p:cNvPicPr>
+            <p:nvPr/>
+          </p:nvPicPr>
+          <p:blipFill>
+            <a:blip r:embed="rId2">
+              <a:extLst>
+                <a:ext uri="{28A0092B-C50C-407E-A947-70E740481C1C}">
+                  <a14:useLocalDpi xmlns:a14="http://schemas.microsoft.com/office/drawing/2010/main" val="0"/>
+                </a:ext>
+                <a:ext uri="{96DAC541-7B7A-43D3-8B79-37D633B846F1}">
+                  <asvg:svgBlip xmlns:asvg="http://schemas.microsoft.com/office/drawing/2016/SVG/main" r:embed="rId3"/>
+                </a:ext>
+              </a:extLst>
+            </a:blip>
+            <a:stretch>
+              <a:fillRect/>
+            </a:stretch>
+          </p:blipFill>
+          <p:spPr>
+            <a:xfrm>
+              <a:off x="3546956" y="5393267"/>
+              <a:ext cx="457200" cy="457200"/>
+            </a:xfrm>
+            <a:prstGeom prst="rect">
+              <a:avLst/>
+            </a:prstGeom>
+          </p:spPr>
+        </p:pic>
+      </p:grpSp>
+      <p:grpSp>
+        <p:nvGrpSpPr>
+          <p:cNvPr id="10" name="Group 9">
+            <a:extLst>
+              <a:ext uri="{FF2B5EF4-FFF2-40B4-BE49-F238E27FC236}">
+                <a16:creationId xmlns:a16="http://schemas.microsoft.com/office/drawing/2014/main" id="{D9474809-0FD7-44E8-9535-D6A6AC288198}"/>
+              </a:ext>
+            </a:extLst>
+          </p:cNvPr>
+          <p:cNvGrpSpPr/>
+          <p:nvPr/>
+        </p:nvGrpSpPr>
+        <p:grpSpPr>
+          <a:xfrm>
+            <a:off x="11327824" y="6033533"/>
+            <a:ext cx="457200" cy="365760"/>
+            <a:chOff x="3546956" y="5393267"/>
+            <a:chExt cx="669064" cy="457200"/>
+          </a:xfrm>
+        </p:grpSpPr>
+        <p:pic>
+          <p:nvPicPr>
+            <p:cNvPr id="11" name="Graphic 10" descr="Exclamation mark with solid fill">
+              <a:extLst>
+                <a:ext uri="{FF2B5EF4-FFF2-40B4-BE49-F238E27FC236}">
+                  <a16:creationId xmlns:a16="http://schemas.microsoft.com/office/drawing/2014/main" id="{86168DC9-83AB-4FDE-9EFB-D1C975A9669F}"/>
+                </a:ext>
+              </a:extLst>
+            </p:cNvPr>
+            <p:cNvPicPr>
+              <a:picLocks noChangeAspect="1"/>
+            </p:cNvPicPr>
+            <p:nvPr/>
+          </p:nvPicPr>
+          <p:blipFill>
+            <a:blip r:embed="rId2">
+              <a:extLst>
+                <a:ext uri="{28A0092B-C50C-407E-A947-70E740481C1C}">
+                  <a14:useLocalDpi xmlns:a14="http://schemas.microsoft.com/office/drawing/2010/main" val="0"/>
+                </a:ext>
+                <a:ext uri="{96DAC541-7B7A-43D3-8B79-37D633B846F1}">
+                  <asvg:svgBlip xmlns:asvg="http://schemas.microsoft.com/office/drawing/2016/SVG/main" r:embed="rId3"/>
+                </a:ext>
+              </a:extLst>
+            </a:blip>
+            <a:stretch>
+              <a:fillRect/>
+            </a:stretch>
+          </p:blipFill>
+          <p:spPr>
+            <a:xfrm>
+              <a:off x="3758820" y="5393267"/>
+              <a:ext cx="457200" cy="457200"/>
+            </a:xfrm>
+            <a:prstGeom prst="rect">
+              <a:avLst/>
+            </a:prstGeom>
+          </p:spPr>
+        </p:pic>
+        <p:pic>
+          <p:nvPicPr>
+            <p:cNvPr id="12" name="Graphic 11" descr="Exclamation mark with solid fill">
+              <a:extLst>
+                <a:ext uri="{FF2B5EF4-FFF2-40B4-BE49-F238E27FC236}">
+                  <a16:creationId xmlns:a16="http://schemas.microsoft.com/office/drawing/2014/main" id="{A7612FCD-96BC-43AE-BDF0-90EBF94D8374}"/>
+                </a:ext>
+              </a:extLst>
+            </p:cNvPr>
+            <p:cNvPicPr>
+              <a:picLocks noChangeAspect="1"/>
+            </p:cNvPicPr>
+            <p:nvPr/>
+          </p:nvPicPr>
+          <p:blipFill>
+            <a:blip r:embed="rId2">
+              <a:extLst>
+                <a:ext uri="{28A0092B-C50C-407E-A947-70E740481C1C}">
+                  <a14:useLocalDpi xmlns:a14="http://schemas.microsoft.com/office/drawing/2010/main" val="0"/>
+                </a:ext>
+                <a:ext uri="{96DAC541-7B7A-43D3-8B79-37D633B846F1}">
+                  <asvg:svgBlip xmlns:asvg="http://schemas.microsoft.com/office/drawing/2016/SVG/main" r:embed="rId3"/>
+                </a:ext>
+              </a:extLst>
+            </a:blip>
+            <a:stretch>
+              <a:fillRect/>
+            </a:stretch>
+          </p:blipFill>
+          <p:spPr>
+            <a:xfrm>
+              <a:off x="3546956" y="5393267"/>
+              <a:ext cx="457200" cy="457200"/>
+            </a:xfrm>
+            <a:prstGeom prst="rect">
+              <a:avLst/>
+            </a:prstGeom>
+          </p:spPr>
+        </p:pic>
+      </p:grpSp>
+    </p:spTree>
+    <p:extLst>
+      <p:ext uri="{BB962C8B-B14F-4D97-AF65-F5344CB8AC3E}">
+        <p14:creationId xmlns:p14="http://schemas.microsoft.com/office/powerpoint/2010/main" val="87599045"/>
+      </p:ext>
+    </p:extLst>
+  </p:cSld>
+  <p:clrMapOvr>
+    <a:masterClrMapping/>
+  </p:clrMapOvr>
+</p:sld>
+</file>
+
+<file path=ppt/slides/slide8.xml><?xml version="1.0" encoding="utf-8"?>
+<p:sld xmlns:a="http://schemas.openxmlformats.org/drawingml/2006/main" xmlns:r="http://schemas.openxmlformats.org/officeDocument/2006/relationships" xmlns:p="http://schemas.openxmlformats.org/presentationml/2006/main">
+  <p:cSld>
+    <p:spTree>
+      <p:nvGrpSpPr>
+        <p:cNvPr id="1" name=""/>
+        <p:cNvGrpSpPr/>
+        <p:nvPr/>
+      </p:nvGrpSpPr>
+      <p:grpSpPr>
+        <a:xfrm>
+          <a:off x="0" y="0"/>
+          <a:ext cx="0" cy="0"/>
+          <a:chOff x="0" y="0"/>
+          <a:chExt cx="0" cy="0"/>
+        </a:xfrm>
+      </p:grpSpPr>
+      <p:sp>
+        <p:nvSpPr>
+          <p:cNvPr id="2" name="Title 1">
+            <a:extLst>
+              <a:ext uri="{FF2B5EF4-FFF2-40B4-BE49-F238E27FC236}">
+                <a16:creationId xmlns:a16="http://schemas.microsoft.com/office/drawing/2014/main" id="{3CD693ED-A2B6-498F-9C1A-C4A2CF235623}"/>
+              </a:ext>
+            </a:extLst>
+          </p:cNvPr>
+          <p:cNvSpPr>
+            <a:spLocks noGrp="1"/>
+          </p:cNvSpPr>
+          <p:nvPr>
+            <p:ph type="title"/>
+          </p:nvPr>
+        </p:nvSpPr>
+        <p:spPr/>
+        <p:txBody>
+          <a:bodyPr/>
+          <a:lstStyle/>
+          <a:p>
+            <a:r>
+              <a:rPr lang="en-US" dirty="0"/>
+              <a:t>Overall Results</a:t>
+            </a:r>
+          </a:p>
+        </p:txBody>
+      </p:sp>
+      <p:sp>
+        <p:nvSpPr>
+          <p:cNvPr id="3" name="Content Placeholder 2">
+            <a:extLst>
+              <a:ext uri="{FF2B5EF4-FFF2-40B4-BE49-F238E27FC236}">
+                <a16:creationId xmlns:a16="http://schemas.microsoft.com/office/drawing/2014/main" id="{5F5D42F4-32F1-48D9-B927-681AF38E645F}"/>
+              </a:ext>
+            </a:extLst>
+          </p:cNvPr>
+          <p:cNvSpPr>
+            <a:spLocks noGrp="1"/>
+          </p:cNvSpPr>
+          <p:nvPr>
+            <p:ph idx="1"/>
+          </p:nvPr>
+        </p:nvSpPr>
+        <p:spPr/>
+        <p:txBody>
+          <a:bodyPr>
+            <a:normAutofit/>
+          </a:bodyPr>
+          <a:lstStyle/>
+          <a:p>
+            <a:pPr marL="457200" indent="-457200">
+              <a:buFont typeface="+mj-lt"/>
+              <a:buAutoNum type="arabicPeriod"/>
+            </a:pPr>
+            <a:r>
+              <a:rPr lang="en-US" sz="2000" b="1" dirty="0"/>
+              <a:t>Holdout method </a:t>
+            </a:r>
+            <a:r>
+              <a:rPr lang="en-US" sz="2000" dirty="0"/>
+              <a:t>is one of the best models in almost all scenarios (similar to the results of other studies)</a:t>
+            </a:r>
+          </a:p>
+          <a:p>
+            <a:pPr marL="457200" indent="-457200">
+              <a:buFont typeface="+mj-lt"/>
+              <a:buAutoNum type="arabicPeriod"/>
+            </a:pPr>
+            <a:r>
+              <a:rPr lang="en-US" sz="2000" dirty="0"/>
+              <a:t>Weighted version of Block-CV </a:t>
+            </a:r>
+            <a:r>
+              <a:rPr lang="en-US" sz="2000" b="1" dirty="0"/>
+              <a:t>is better </a:t>
+            </a:r>
+            <a:r>
+              <a:rPr lang="en-US" sz="2000" dirty="0"/>
+              <a:t>than the original (less error and lower variance)</a:t>
+            </a:r>
+          </a:p>
+          <a:p>
+            <a:pPr marL="457200" indent="-457200">
+              <a:buFont typeface="+mj-lt"/>
+              <a:buAutoNum type="arabicPeriod"/>
+            </a:pPr>
+            <a:r>
+              <a:rPr lang="en-US" sz="2000" dirty="0"/>
+              <a:t>Weighted version of Growing Window </a:t>
+            </a:r>
+            <a:r>
+              <a:rPr lang="en-US" sz="2000" b="1" dirty="0"/>
+              <a:t>is better </a:t>
+            </a:r>
+            <a:r>
+              <a:rPr lang="en-US" sz="2000" dirty="0"/>
+              <a:t>than the original (less error and lower variance)</a:t>
+            </a:r>
+          </a:p>
+          <a:p>
+            <a:pPr marL="457200" indent="-457200">
+              <a:buFont typeface="+mj-lt"/>
+              <a:buAutoNum type="arabicPeriod"/>
+            </a:pPr>
+            <a:r>
+              <a:rPr lang="en-US" sz="2000" dirty="0"/>
+              <a:t>Weighted version of Rolling Window </a:t>
+            </a:r>
+            <a:r>
+              <a:rPr lang="en-US" sz="2000" b="1" dirty="0"/>
+              <a:t>is worse </a:t>
+            </a:r>
+            <a:r>
+              <a:rPr lang="en-US" sz="2000" dirty="0"/>
+              <a:t>than the original</a:t>
+            </a:r>
+          </a:p>
+          <a:p>
+            <a:pPr marL="457200" indent="-457200">
+              <a:buFont typeface="+mj-lt"/>
+              <a:buAutoNum type="arabicPeriod"/>
+            </a:pPr>
+            <a:r>
+              <a:rPr lang="en-US" sz="2000" dirty="0"/>
+              <a:t>Markov CV </a:t>
+            </a:r>
+            <a:r>
+              <a:rPr lang="en-US" sz="2000" b="1" dirty="0"/>
+              <a:t>highly overestimates</a:t>
+            </a:r>
+            <a:r>
+              <a:rPr lang="en-US" sz="2000" dirty="0"/>
+              <a:t> the error on the </a:t>
+            </a:r>
+            <a:r>
+              <a:rPr lang="en-US" sz="2000" b="1" dirty="0"/>
+              <a:t>Decision Tree</a:t>
+            </a:r>
+            <a:r>
+              <a:rPr lang="en-US" sz="2000" dirty="0"/>
+              <a:t>, but performs </a:t>
+            </a:r>
+            <a:r>
+              <a:rPr lang="en-US" sz="2000" b="1" dirty="0"/>
+              <a:t>good on ARMA</a:t>
+            </a:r>
+            <a:r>
+              <a:rPr lang="en-US" sz="2000" dirty="0"/>
+              <a:t>. Indicates that is </a:t>
+            </a:r>
+            <a:r>
+              <a:rPr lang="en-US" sz="2000" b="1" dirty="0"/>
+              <a:t>highly sensitive to the model used</a:t>
+            </a:r>
+            <a:r>
+              <a:rPr lang="en-US" sz="2000" dirty="0"/>
+              <a:t>.</a:t>
+            </a:r>
+          </a:p>
+          <a:p>
+            <a:pPr marL="457200" indent="-457200">
+              <a:buFont typeface="+mj-lt"/>
+              <a:buAutoNum type="arabicPeriod"/>
+            </a:pPr>
+            <a:r>
+              <a:rPr lang="en-US" sz="2000" dirty="0"/>
+              <a:t>Model that </a:t>
+            </a:r>
+            <a:r>
+              <a:rPr lang="en-US" sz="2000" b="1" dirty="0"/>
+              <a:t>train in the future</a:t>
+            </a:r>
+            <a:r>
+              <a:rPr lang="en-US" sz="2000" dirty="0"/>
+              <a:t> underestimate the error</a:t>
+            </a:r>
+            <a:r>
+              <a:rPr lang="en-US" sz="2000" b="1" dirty="0"/>
+              <a:t> (sign of leakage!)</a:t>
+            </a:r>
+          </a:p>
+          <a:p>
+            <a:pPr marL="457200" indent="-457200">
+              <a:buFont typeface="+mj-lt"/>
+              <a:buAutoNum type="arabicPeriod"/>
+            </a:pPr>
+            <a:endParaRPr lang="en-US" sz="2000" dirty="0"/>
+          </a:p>
+        </p:txBody>
+      </p:sp>
+      <p:sp>
+        <p:nvSpPr>
+          <p:cNvPr id="4" name="TextBox 3">
+            <a:extLst>
+              <a:ext uri="{FF2B5EF4-FFF2-40B4-BE49-F238E27FC236}">
+                <a16:creationId xmlns:a16="http://schemas.microsoft.com/office/drawing/2014/main" id="{B267A4A9-980C-4866-B7C2-9208AFFE5B52}"/>
+              </a:ext>
+            </a:extLst>
+          </p:cNvPr>
+          <p:cNvSpPr txBox="1"/>
+          <p:nvPr/>
+        </p:nvSpPr>
+        <p:spPr>
+          <a:xfrm>
+            <a:off x="7289800" y="6053666"/>
+            <a:ext cx="4256422" cy="369332"/>
+          </a:xfrm>
+          <a:prstGeom prst="rect">
+            <a:avLst/>
+          </a:prstGeom>
+          <a:noFill/>
+        </p:spPr>
+        <p:txBody>
+          <a:bodyPr wrap="none" rtlCol="0">
+            <a:spAutoFit/>
+          </a:bodyPr>
+          <a:lstStyle/>
+          <a:p>
+            <a:r>
+              <a:rPr lang="en-US" dirty="0"/>
+              <a:t>These results are nowhere in the literature</a:t>
+            </a:r>
+          </a:p>
+        </p:txBody>
+      </p:sp>
+      <p:grpSp>
+        <p:nvGrpSpPr>
+          <p:cNvPr id="9" name="Group 8">
+            <a:extLst>
+              <a:ext uri="{FF2B5EF4-FFF2-40B4-BE49-F238E27FC236}">
+                <a16:creationId xmlns:a16="http://schemas.microsoft.com/office/drawing/2014/main" id="{E2B00F31-641F-44C4-A0BF-EF810811F371}"/>
+              </a:ext>
+            </a:extLst>
+          </p:cNvPr>
+          <p:cNvGrpSpPr/>
+          <p:nvPr/>
+        </p:nvGrpSpPr>
+        <p:grpSpPr>
+          <a:xfrm>
+            <a:off x="6857426" y="6053668"/>
+            <a:ext cx="457200" cy="365760"/>
+            <a:chOff x="3546956" y="5393267"/>
+            <a:chExt cx="669064" cy="457200"/>
+          </a:xfrm>
+        </p:grpSpPr>
+        <p:pic>
+          <p:nvPicPr>
+            <p:cNvPr id="7" name="Graphic 6" descr="Exclamation mark with solid fill">
+              <a:extLst>
+                <a:ext uri="{FF2B5EF4-FFF2-40B4-BE49-F238E27FC236}">
+                  <a16:creationId xmlns:a16="http://schemas.microsoft.com/office/drawing/2014/main" id="{0E46AC3B-243E-44E2-AC56-9CC8C17C9C71}"/>
+                </a:ext>
+              </a:extLst>
+            </p:cNvPr>
+            <p:cNvPicPr>
+              <a:picLocks noChangeAspect="1"/>
+            </p:cNvPicPr>
+            <p:nvPr/>
+          </p:nvPicPr>
+          <p:blipFill>
+            <a:blip r:embed="rId2">
+              <a:extLst>
+                <a:ext uri="{28A0092B-C50C-407E-A947-70E740481C1C}">
+                  <a14:useLocalDpi xmlns:a14="http://schemas.microsoft.com/office/drawing/2010/main" val="0"/>
+                </a:ext>
+                <a:ext uri="{96DAC541-7B7A-43D3-8B79-37D633B846F1}">
+                  <asvg:svgBlip xmlns:asvg="http://schemas.microsoft.com/office/drawing/2016/SVG/main" r:embed="rId3"/>
+                </a:ext>
+              </a:extLst>
+            </a:blip>
+            <a:stretch>
+              <a:fillRect/>
+            </a:stretch>
+          </p:blipFill>
+          <p:spPr>
+            <a:xfrm>
+              <a:off x="3758820" y="5393267"/>
+              <a:ext cx="457200" cy="457200"/>
+            </a:xfrm>
+            <a:prstGeom prst="rect">
+              <a:avLst/>
+            </a:prstGeom>
+          </p:spPr>
+        </p:pic>
+        <p:pic>
+          <p:nvPicPr>
+            <p:cNvPr id="8" name="Graphic 7" descr="Exclamation mark with solid fill">
+              <a:extLst>
+                <a:ext uri="{FF2B5EF4-FFF2-40B4-BE49-F238E27FC236}">
+                  <a16:creationId xmlns:a16="http://schemas.microsoft.com/office/drawing/2014/main" id="{E2E49FE5-86B7-42C4-9E7B-CE08EF338C14}"/>
+                </a:ext>
+              </a:extLst>
+            </p:cNvPr>
+            <p:cNvPicPr>
+              <a:picLocks noChangeAspect="1"/>
+            </p:cNvPicPr>
+            <p:nvPr/>
+          </p:nvPicPr>
+          <p:blipFill>
+            <a:blip r:embed="rId2">
+              <a:extLst>
+                <a:ext uri="{28A0092B-C50C-407E-A947-70E740481C1C}">
+                  <a14:useLocalDpi xmlns:a14="http://schemas.microsoft.com/office/drawing/2010/main" val="0"/>
+                </a:ext>
+                <a:ext uri="{96DAC541-7B7A-43D3-8B79-37D633B846F1}">
+                  <asvg:svgBlip xmlns:asvg="http://schemas.microsoft.com/office/drawing/2016/SVG/main" r:embed="rId3"/>
+                </a:ext>
+              </a:extLst>
+            </a:blip>
+            <a:stretch>
+              <a:fillRect/>
+            </a:stretch>
+          </p:blipFill>
+          <p:spPr>
+            <a:xfrm>
+              <a:off x="3546956" y="5393267"/>
+              <a:ext cx="457200" cy="457200"/>
+            </a:xfrm>
+            <a:prstGeom prst="rect">
+              <a:avLst/>
+            </a:prstGeom>
+          </p:spPr>
+        </p:pic>
+      </p:grpSp>
+      <p:grpSp>
+        <p:nvGrpSpPr>
+          <p:cNvPr id="10" name="Group 9">
+            <a:extLst>
+              <a:ext uri="{FF2B5EF4-FFF2-40B4-BE49-F238E27FC236}">
+                <a16:creationId xmlns:a16="http://schemas.microsoft.com/office/drawing/2014/main" id="{D9474809-0FD7-44E8-9535-D6A6AC288198}"/>
+              </a:ext>
+            </a:extLst>
+          </p:cNvPr>
+          <p:cNvGrpSpPr/>
+          <p:nvPr/>
+        </p:nvGrpSpPr>
+        <p:grpSpPr>
+          <a:xfrm>
+            <a:off x="11327824" y="6033533"/>
+            <a:ext cx="457200" cy="365760"/>
+            <a:chOff x="3546956" y="5393267"/>
+            <a:chExt cx="669064" cy="457200"/>
+          </a:xfrm>
+        </p:grpSpPr>
+        <p:pic>
+          <p:nvPicPr>
+            <p:cNvPr id="11" name="Graphic 10" descr="Exclamation mark with solid fill">
+              <a:extLst>
+                <a:ext uri="{FF2B5EF4-FFF2-40B4-BE49-F238E27FC236}">
+                  <a16:creationId xmlns:a16="http://schemas.microsoft.com/office/drawing/2014/main" id="{86168DC9-83AB-4FDE-9EFB-D1C975A9669F}"/>
+                </a:ext>
+              </a:extLst>
+            </p:cNvPr>
+            <p:cNvPicPr>
+              <a:picLocks noChangeAspect="1"/>
+            </p:cNvPicPr>
+            <p:nvPr/>
+          </p:nvPicPr>
+          <p:blipFill>
+            <a:blip r:embed="rId2">
+              <a:extLst>
+                <a:ext uri="{28A0092B-C50C-407E-A947-70E740481C1C}">
+                  <a14:useLocalDpi xmlns:a14="http://schemas.microsoft.com/office/drawing/2010/main" val="0"/>
+                </a:ext>
+                <a:ext uri="{96DAC541-7B7A-43D3-8B79-37D633B846F1}">
+                  <asvg:svgBlip xmlns:asvg="http://schemas.microsoft.com/office/drawing/2016/SVG/main" r:embed="rId3"/>
+                </a:ext>
+              </a:extLst>
+            </a:blip>
+            <a:stretch>
+              <a:fillRect/>
+            </a:stretch>
+          </p:blipFill>
+          <p:spPr>
+            <a:xfrm>
+              <a:off x="3758820" y="5393267"/>
+              <a:ext cx="457200" cy="457200"/>
+            </a:xfrm>
+            <a:prstGeom prst="rect">
+              <a:avLst/>
+            </a:prstGeom>
+          </p:spPr>
+        </p:pic>
+        <p:pic>
+          <p:nvPicPr>
+            <p:cNvPr id="12" name="Graphic 11" descr="Exclamation mark with solid fill">
+              <a:extLst>
+                <a:ext uri="{FF2B5EF4-FFF2-40B4-BE49-F238E27FC236}">
+                  <a16:creationId xmlns:a16="http://schemas.microsoft.com/office/drawing/2014/main" id="{A7612FCD-96BC-43AE-BDF0-90EBF94D8374}"/>
+                </a:ext>
+              </a:extLst>
+            </p:cNvPr>
+            <p:cNvPicPr>
+              <a:picLocks noChangeAspect="1"/>
+            </p:cNvPicPr>
+            <p:nvPr/>
+          </p:nvPicPr>
+          <p:blipFill>
+            <a:blip r:embed="rId2">
+              <a:extLst>
+                <a:ext uri="{28A0092B-C50C-407E-A947-70E740481C1C}">
+                  <a14:useLocalDpi xmlns:a14="http://schemas.microsoft.com/office/drawing/2010/main" val="0"/>
+                </a:ext>
+                <a:ext uri="{96DAC541-7B7A-43D3-8B79-37D633B846F1}">
+                  <asvg:svgBlip xmlns:asvg="http://schemas.microsoft.com/office/drawing/2016/SVG/main" r:embed="rId3"/>
+                </a:ext>
+              </a:extLst>
+            </a:blip>
+            <a:stretch>
+              <a:fillRect/>
+            </a:stretch>
+          </p:blipFill>
+          <p:spPr>
+            <a:xfrm>
+              <a:off x="3546956" y="5393267"/>
+              <a:ext cx="457200" cy="457200"/>
+            </a:xfrm>
+            <a:prstGeom prst="rect">
+              <a:avLst/>
+            </a:prstGeom>
+          </p:spPr>
+        </p:pic>
+      </p:grpSp>
+      <p:grpSp>
+        <p:nvGrpSpPr>
+          <p:cNvPr id="13" name="Group 12">
+            <a:extLst>
+              <a:ext uri="{FF2B5EF4-FFF2-40B4-BE49-F238E27FC236}">
+                <a16:creationId xmlns:a16="http://schemas.microsoft.com/office/drawing/2014/main" id="{53903543-1BED-4114-A429-4BCB0B55594F}"/>
+              </a:ext>
+            </a:extLst>
+          </p:cNvPr>
+          <p:cNvGrpSpPr/>
+          <p:nvPr/>
+        </p:nvGrpSpPr>
+        <p:grpSpPr>
+          <a:xfrm>
+            <a:off x="10303359" y="2497668"/>
+            <a:ext cx="457200" cy="365760"/>
+            <a:chOff x="3546956" y="5393267"/>
+            <a:chExt cx="669064" cy="457200"/>
+          </a:xfrm>
+        </p:grpSpPr>
+        <p:pic>
+          <p:nvPicPr>
+            <p:cNvPr id="14" name="Graphic 13" descr="Exclamation mark with solid fill">
+              <a:extLst>
+                <a:ext uri="{FF2B5EF4-FFF2-40B4-BE49-F238E27FC236}">
+                  <a16:creationId xmlns:a16="http://schemas.microsoft.com/office/drawing/2014/main" id="{9C8937E1-D593-4710-A5E8-A07644BFDB9B}"/>
+                </a:ext>
+              </a:extLst>
+            </p:cNvPr>
+            <p:cNvPicPr>
+              <a:picLocks noChangeAspect="1"/>
+            </p:cNvPicPr>
+            <p:nvPr/>
+          </p:nvPicPr>
+          <p:blipFill>
+            <a:blip r:embed="rId2">
+              <a:extLst>
+                <a:ext uri="{28A0092B-C50C-407E-A947-70E740481C1C}">
+                  <a14:useLocalDpi xmlns:a14="http://schemas.microsoft.com/office/drawing/2010/main" val="0"/>
+                </a:ext>
+                <a:ext uri="{96DAC541-7B7A-43D3-8B79-37D633B846F1}">
+                  <asvg:svgBlip xmlns:asvg="http://schemas.microsoft.com/office/drawing/2016/SVG/main" r:embed="rId3"/>
+                </a:ext>
+              </a:extLst>
+            </a:blip>
+            <a:stretch>
+              <a:fillRect/>
+            </a:stretch>
+          </p:blipFill>
+          <p:spPr>
+            <a:xfrm>
+              <a:off x="3758820" y="5393267"/>
+              <a:ext cx="457200" cy="457200"/>
+            </a:xfrm>
+            <a:prstGeom prst="rect">
+              <a:avLst/>
+            </a:prstGeom>
+          </p:spPr>
+        </p:pic>
+        <p:pic>
+          <p:nvPicPr>
+            <p:cNvPr id="15" name="Graphic 14" descr="Exclamation mark with solid fill">
+              <a:extLst>
+                <a:ext uri="{FF2B5EF4-FFF2-40B4-BE49-F238E27FC236}">
+                  <a16:creationId xmlns:a16="http://schemas.microsoft.com/office/drawing/2014/main" id="{3B7FF7DF-FA16-4429-A828-6F83E9546297}"/>
+                </a:ext>
+              </a:extLst>
+            </p:cNvPr>
+            <p:cNvPicPr>
+              <a:picLocks noChangeAspect="1"/>
+            </p:cNvPicPr>
+            <p:nvPr/>
+          </p:nvPicPr>
+          <p:blipFill>
+            <a:blip r:embed="rId2">
+              <a:extLst>
+                <a:ext uri="{28A0092B-C50C-407E-A947-70E740481C1C}">
+                  <a14:useLocalDpi xmlns:a14="http://schemas.microsoft.com/office/drawing/2010/main" val="0"/>
+                </a:ext>
+                <a:ext uri="{96DAC541-7B7A-43D3-8B79-37D633B846F1}">
+                  <asvg:svgBlip xmlns:asvg="http://schemas.microsoft.com/office/drawing/2016/SVG/main" r:embed="rId3"/>
+                </a:ext>
+              </a:extLst>
+            </a:blip>
+            <a:stretch>
+              <a:fillRect/>
+            </a:stretch>
+          </p:blipFill>
+          <p:spPr>
+            <a:xfrm>
+              <a:off x="3546956" y="5393267"/>
+              <a:ext cx="457200" cy="457200"/>
+            </a:xfrm>
+            <a:prstGeom prst="rect">
+              <a:avLst/>
+            </a:prstGeom>
+          </p:spPr>
+        </p:pic>
+      </p:grpSp>
+      <p:grpSp>
+        <p:nvGrpSpPr>
+          <p:cNvPr id="16" name="Group 15">
+            <a:extLst>
+              <a:ext uri="{FF2B5EF4-FFF2-40B4-BE49-F238E27FC236}">
+                <a16:creationId xmlns:a16="http://schemas.microsoft.com/office/drawing/2014/main" id="{7D4671DF-E3E4-4BA1-BF6C-D542CD988405}"/>
+              </a:ext>
+            </a:extLst>
+          </p:cNvPr>
+          <p:cNvGrpSpPr/>
+          <p:nvPr/>
+        </p:nvGrpSpPr>
+        <p:grpSpPr>
+          <a:xfrm>
+            <a:off x="11184600" y="2946402"/>
+            <a:ext cx="457200" cy="365760"/>
+            <a:chOff x="3546956" y="5393267"/>
+            <a:chExt cx="669064" cy="457200"/>
+          </a:xfrm>
+        </p:grpSpPr>
+        <p:pic>
+          <p:nvPicPr>
+            <p:cNvPr id="17" name="Graphic 16" descr="Exclamation mark with solid fill">
+              <a:extLst>
+                <a:ext uri="{FF2B5EF4-FFF2-40B4-BE49-F238E27FC236}">
+                  <a16:creationId xmlns:a16="http://schemas.microsoft.com/office/drawing/2014/main" id="{2C9B6345-5937-446B-B00E-8424DCA92E54}"/>
+                </a:ext>
+              </a:extLst>
+            </p:cNvPr>
+            <p:cNvPicPr>
+              <a:picLocks noChangeAspect="1"/>
+            </p:cNvPicPr>
+            <p:nvPr/>
+          </p:nvPicPr>
+          <p:blipFill>
+            <a:blip r:embed="rId2">
+              <a:extLst>
+                <a:ext uri="{28A0092B-C50C-407E-A947-70E740481C1C}">
+                  <a14:useLocalDpi xmlns:a14="http://schemas.microsoft.com/office/drawing/2010/main" val="0"/>
+                </a:ext>
+                <a:ext uri="{96DAC541-7B7A-43D3-8B79-37D633B846F1}">
+                  <asvg:svgBlip xmlns:asvg="http://schemas.microsoft.com/office/drawing/2016/SVG/main" r:embed="rId3"/>
+                </a:ext>
+              </a:extLst>
+            </a:blip>
+            <a:stretch>
+              <a:fillRect/>
+            </a:stretch>
+          </p:blipFill>
+          <p:spPr>
+            <a:xfrm>
+              <a:off x="3758820" y="5393267"/>
+              <a:ext cx="457200" cy="457200"/>
+            </a:xfrm>
+            <a:prstGeom prst="rect">
+              <a:avLst/>
+            </a:prstGeom>
+          </p:spPr>
+        </p:pic>
+        <p:pic>
+          <p:nvPicPr>
+            <p:cNvPr id="18" name="Graphic 17" descr="Exclamation mark with solid fill">
+              <a:extLst>
+                <a:ext uri="{FF2B5EF4-FFF2-40B4-BE49-F238E27FC236}">
+                  <a16:creationId xmlns:a16="http://schemas.microsoft.com/office/drawing/2014/main" id="{F899BDE5-EB11-4804-8A53-EAB89073BF2A}"/>
+                </a:ext>
+              </a:extLst>
+            </p:cNvPr>
+            <p:cNvPicPr>
+              <a:picLocks noChangeAspect="1"/>
+            </p:cNvPicPr>
+            <p:nvPr/>
+          </p:nvPicPr>
+          <p:blipFill>
+            <a:blip r:embed="rId2">
+              <a:extLst>
+                <a:ext uri="{28A0092B-C50C-407E-A947-70E740481C1C}">
+                  <a14:useLocalDpi xmlns:a14="http://schemas.microsoft.com/office/drawing/2010/main" val="0"/>
+                </a:ext>
+                <a:ext uri="{96DAC541-7B7A-43D3-8B79-37D633B846F1}">
+                  <asvg:svgBlip xmlns:asvg="http://schemas.microsoft.com/office/drawing/2016/SVG/main" r:embed="rId3"/>
+                </a:ext>
+              </a:extLst>
+            </a:blip>
+            <a:stretch>
+              <a:fillRect/>
+            </a:stretch>
+          </p:blipFill>
+          <p:spPr>
+            <a:xfrm>
+              <a:off x="3546956" y="5393267"/>
+              <a:ext cx="457200" cy="457200"/>
+            </a:xfrm>
+            <a:prstGeom prst="rect">
+              <a:avLst/>
+            </a:prstGeom>
+          </p:spPr>
+        </p:pic>
+      </p:grpSp>
+      <p:grpSp>
+        <p:nvGrpSpPr>
+          <p:cNvPr id="19" name="Group 18">
+            <a:extLst>
+              <a:ext uri="{FF2B5EF4-FFF2-40B4-BE49-F238E27FC236}">
+                <a16:creationId xmlns:a16="http://schemas.microsoft.com/office/drawing/2014/main" id="{F7BC0366-9C02-4A20-9DBC-83700D00E700}"/>
+              </a:ext>
+            </a:extLst>
+          </p:cNvPr>
+          <p:cNvGrpSpPr/>
+          <p:nvPr/>
+        </p:nvGrpSpPr>
+        <p:grpSpPr>
+          <a:xfrm>
+            <a:off x="7822626" y="3312162"/>
+            <a:ext cx="457200" cy="365760"/>
+            <a:chOff x="3546956" y="5393267"/>
+            <a:chExt cx="669064" cy="457200"/>
+          </a:xfrm>
+        </p:grpSpPr>
+        <p:pic>
+          <p:nvPicPr>
+            <p:cNvPr id="20" name="Graphic 19" descr="Exclamation mark with solid fill">
+              <a:extLst>
+                <a:ext uri="{FF2B5EF4-FFF2-40B4-BE49-F238E27FC236}">
+                  <a16:creationId xmlns:a16="http://schemas.microsoft.com/office/drawing/2014/main" id="{8F882AF2-8FD1-4793-AAD7-6B51C9B5BC57}"/>
+                </a:ext>
+              </a:extLst>
+            </p:cNvPr>
+            <p:cNvPicPr>
+              <a:picLocks noChangeAspect="1"/>
+            </p:cNvPicPr>
+            <p:nvPr/>
+          </p:nvPicPr>
+          <p:blipFill>
+            <a:blip r:embed="rId2">
+              <a:extLst>
+                <a:ext uri="{28A0092B-C50C-407E-A947-70E740481C1C}">
+                  <a14:useLocalDpi xmlns:a14="http://schemas.microsoft.com/office/drawing/2010/main" val="0"/>
+                </a:ext>
+                <a:ext uri="{96DAC541-7B7A-43D3-8B79-37D633B846F1}">
+                  <asvg:svgBlip xmlns:asvg="http://schemas.microsoft.com/office/drawing/2016/SVG/main" r:embed="rId3"/>
+                </a:ext>
+              </a:extLst>
+            </a:blip>
+            <a:stretch>
+              <a:fillRect/>
+            </a:stretch>
+          </p:blipFill>
+          <p:spPr>
+            <a:xfrm>
+              <a:off x="3758820" y="5393267"/>
+              <a:ext cx="457200" cy="457200"/>
+            </a:xfrm>
+            <a:prstGeom prst="rect">
+              <a:avLst/>
+            </a:prstGeom>
+          </p:spPr>
+        </p:pic>
+        <p:pic>
+          <p:nvPicPr>
+            <p:cNvPr id="21" name="Graphic 20" descr="Exclamation mark with solid fill">
+              <a:extLst>
+                <a:ext uri="{FF2B5EF4-FFF2-40B4-BE49-F238E27FC236}">
+                  <a16:creationId xmlns:a16="http://schemas.microsoft.com/office/drawing/2014/main" id="{0ABFCBE0-837A-4DC8-947F-6E7707D63B39}"/>
+                </a:ext>
+              </a:extLst>
+            </p:cNvPr>
+            <p:cNvPicPr>
+              <a:picLocks noChangeAspect="1"/>
+            </p:cNvPicPr>
+            <p:nvPr/>
+          </p:nvPicPr>
+          <p:blipFill>
+            <a:blip r:embed="rId2">
+              <a:extLst>
+                <a:ext uri="{28A0092B-C50C-407E-A947-70E740481C1C}">
+                  <a14:useLocalDpi xmlns:a14="http://schemas.microsoft.com/office/drawing/2010/main" val="0"/>
+                </a:ext>
+                <a:ext uri="{96DAC541-7B7A-43D3-8B79-37D633B846F1}">
+                  <asvg:svgBlip xmlns:asvg="http://schemas.microsoft.com/office/drawing/2016/SVG/main" r:embed="rId3"/>
+                </a:ext>
+              </a:extLst>
+            </a:blip>
+            <a:stretch>
+              <a:fillRect/>
+            </a:stretch>
+          </p:blipFill>
+          <p:spPr>
+            <a:xfrm>
+              <a:off x="3546956" y="5393267"/>
+              <a:ext cx="457200" cy="457200"/>
+            </a:xfrm>
+            <a:prstGeom prst="rect">
+              <a:avLst/>
+            </a:prstGeom>
+          </p:spPr>
+        </p:pic>
+      </p:grpSp>
+      <p:grpSp>
+        <p:nvGrpSpPr>
+          <p:cNvPr id="22" name="Group 21">
+            <a:extLst>
+              <a:ext uri="{FF2B5EF4-FFF2-40B4-BE49-F238E27FC236}">
+                <a16:creationId xmlns:a16="http://schemas.microsoft.com/office/drawing/2014/main" id="{21B3021C-62A9-4447-B84A-AA40CE657098}"/>
+              </a:ext>
+            </a:extLst>
+          </p:cNvPr>
+          <p:cNvGrpSpPr/>
+          <p:nvPr/>
+        </p:nvGrpSpPr>
+        <p:grpSpPr>
+          <a:xfrm>
+            <a:off x="8804757" y="4359488"/>
+            <a:ext cx="457200" cy="365760"/>
+            <a:chOff x="3546956" y="5393267"/>
+            <a:chExt cx="669064" cy="457200"/>
+          </a:xfrm>
+        </p:grpSpPr>
+        <p:pic>
+          <p:nvPicPr>
+            <p:cNvPr id="23" name="Graphic 22" descr="Exclamation mark with solid fill">
+              <a:extLst>
+                <a:ext uri="{FF2B5EF4-FFF2-40B4-BE49-F238E27FC236}">
+                  <a16:creationId xmlns:a16="http://schemas.microsoft.com/office/drawing/2014/main" id="{5107AE54-2EB4-4624-8DF9-0A94A70A4E75}"/>
+                </a:ext>
+              </a:extLst>
+            </p:cNvPr>
+            <p:cNvPicPr>
+              <a:picLocks noChangeAspect="1"/>
+            </p:cNvPicPr>
+            <p:nvPr/>
+          </p:nvPicPr>
+          <p:blipFill>
+            <a:blip r:embed="rId2">
+              <a:extLst>
+                <a:ext uri="{28A0092B-C50C-407E-A947-70E740481C1C}">
+                  <a14:useLocalDpi xmlns:a14="http://schemas.microsoft.com/office/drawing/2010/main" val="0"/>
+                </a:ext>
+                <a:ext uri="{96DAC541-7B7A-43D3-8B79-37D633B846F1}">
+                  <asvg:svgBlip xmlns:asvg="http://schemas.microsoft.com/office/drawing/2016/SVG/main" r:embed="rId3"/>
+                </a:ext>
+              </a:extLst>
+            </a:blip>
+            <a:stretch>
+              <a:fillRect/>
+            </a:stretch>
+          </p:blipFill>
+          <p:spPr>
+            <a:xfrm>
+              <a:off x="3758820" y="5393267"/>
+              <a:ext cx="457200" cy="457200"/>
+            </a:xfrm>
+            <a:prstGeom prst="rect">
+              <a:avLst/>
+            </a:prstGeom>
+          </p:spPr>
+        </p:pic>
+        <p:pic>
+          <p:nvPicPr>
+            <p:cNvPr id="24" name="Graphic 23" descr="Exclamation mark with solid fill">
+              <a:extLst>
+                <a:ext uri="{FF2B5EF4-FFF2-40B4-BE49-F238E27FC236}">
+                  <a16:creationId xmlns:a16="http://schemas.microsoft.com/office/drawing/2014/main" id="{2F2B71CD-A358-4778-901C-1DCE7CF52DAA}"/>
+                </a:ext>
+              </a:extLst>
+            </p:cNvPr>
+            <p:cNvPicPr>
+              <a:picLocks noChangeAspect="1"/>
+            </p:cNvPicPr>
+            <p:nvPr/>
+          </p:nvPicPr>
+          <p:blipFill>
+            <a:blip r:embed="rId2">
+              <a:extLst>
+                <a:ext uri="{28A0092B-C50C-407E-A947-70E740481C1C}">
+                  <a14:useLocalDpi xmlns:a14="http://schemas.microsoft.com/office/drawing/2010/main" val="0"/>
+                </a:ext>
+                <a:ext uri="{96DAC541-7B7A-43D3-8B79-37D633B846F1}">
+                  <asvg:svgBlip xmlns:asvg="http://schemas.microsoft.com/office/drawing/2016/SVG/main" r:embed="rId3"/>
+                </a:ext>
+              </a:extLst>
+            </a:blip>
+            <a:stretch>
+              <a:fillRect/>
+            </a:stretch>
+          </p:blipFill>
+          <p:spPr>
+            <a:xfrm>
+              <a:off x="3546956" y="5393267"/>
+              <a:ext cx="457200" cy="457200"/>
+            </a:xfrm>
+            <a:prstGeom prst="rect">
+              <a:avLst/>
+            </a:prstGeom>
+          </p:spPr>
+        </p:pic>
+      </p:grpSp>
+    </p:spTree>
+    <p:extLst>
+      <p:ext uri="{BB962C8B-B14F-4D97-AF65-F5344CB8AC3E}">
+        <p14:creationId xmlns:p14="http://schemas.microsoft.com/office/powerpoint/2010/main" val="4252420667"/>
+      </p:ext>
+    </p:extLst>
+  </p:cSld>
+  <p:clrMapOvr>
+    <a:masterClrMapping/>
+  </p:clrMapOvr>
+</p:sld>
+</file>
+
+<file path=ppt/slides/slide9.xml><?xml version="1.0" encoding="utf-8"?>
+<p:sld xmlns:a="http://schemas.openxmlformats.org/drawingml/2006/main" xmlns:r="http://schemas.openxmlformats.org/officeDocument/2006/relationships" xmlns:p="http://schemas.openxmlformats.org/presentationml/2006/main">
+  <p:cSld>
+    <p:spTree>
+      <p:nvGrpSpPr>
+        <p:cNvPr id="1" name=""/>
+        <p:cNvGrpSpPr/>
+        <p:nvPr/>
+      </p:nvGrpSpPr>
+      <p:grpSpPr>
+        <a:xfrm>
+          <a:off x="0" y="0"/>
+          <a:ext cx="0" cy="0"/>
+          <a:chOff x="0" y="0"/>
+          <a:chExt cx="0" cy="0"/>
+        </a:xfrm>
+      </p:grpSpPr>
+      <p:pic>
+        <p:nvPicPr>
+          <p:cNvPr id="13" name="Picture 12">
+            <a:extLst>
+              <a:ext uri="{FF2B5EF4-FFF2-40B4-BE49-F238E27FC236}">
+                <a16:creationId xmlns:a16="http://schemas.microsoft.com/office/drawing/2014/main" id="{4CF45912-6F3B-462A-80F0-3853AC022CDE}"/>
+              </a:ext>
+            </a:extLst>
+          </p:cNvPr>
+          <p:cNvPicPr>
+            <a:picLocks noChangeAspect="1"/>
+          </p:cNvPicPr>
+          <p:nvPr/>
+        </p:nvPicPr>
+        <p:blipFill>
+          <a:blip r:embed="rId2"/>
+          <a:stretch>
+            <a:fillRect/>
+          </a:stretch>
+        </p:blipFill>
+        <p:spPr>
+          <a:xfrm>
+            <a:off x="838200" y="1399032"/>
+            <a:ext cx="10820193" cy="5458968"/>
+          </a:xfrm>
+          <a:prstGeom prst="rect">
+            <a:avLst/>
+          </a:prstGeom>
+        </p:spPr>
+      </p:pic>
+      <p:sp>
+        <p:nvSpPr>
+          <p:cNvPr id="2" name="Title 1">
+            <a:extLst>
+              <a:ext uri="{FF2B5EF4-FFF2-40B4-BE49-F238E27FC236}">
+                <a16:creationId xmlns:a16="http://schemas.microsoft.com/office/drawing/2014/main" id="{035535A7-2050-475D-94CA-7B0B00D4DD72}"/>
+              </a:ext>
+            </a:extLst>
+          </p:cNvPr>
+          <p:cNvSpPr>
+            <a:spLocks noGrp="1"/>
+          </p:cNvSpPr>
+          <p:nvPr>
+            <p:ph type="title"/>
+          </p:nvPr>
+        </p:nvSpPr>
+        <p:spPr/>
+        <p:txBody>
+          <a:bodyPr/>
+          <a:lstStyle/>
+          <a:p>
+            <a:r>
+              <a:rPr lang="en-US" dirty="0"/>
+              <a:t>Overall Results – Decision Tree</a:t>
+            </a:r>
+          </a:p>
+        </p:txBody>
+      </p:sp>
+      <p:sp>
+        <p:nvSpPr>
+          <p:cNvPr id="10" name="Rectangle 9">
+            <a:extLst>
+              <a:ext uri="{FF2B5EF4-FFF2-40B4-BE49-F238E27FC236}">
+                <a16:creationId xmlns:a16="http://schemas.microsoft.com/office/drawing/2014/main" id="{BDDE5118-1D91-499C-AB3D-0091AD088762}"/>
+              </a:ext>
+            </a:extLst>
+          </p:cNvPr>
+          <p:cNvSpPr/>
+          <p:nvPr/>
+        </p:nvSpPr>
+        <p:spPr>
+          <a:xfrm>
+            <a:off x="7221860" y="1739378"/>
+            <a:ext cx="609600" cy="4778276"/>
+          </a:xfrm>
+          <a:prstGeom prst="rect">
+            <a:avLst/>
+          </a:prstGeom>
+          <a:noFill/>
+          <a:ln w="38100">
+            <a:solidFill>
+              <a:srgbClr val="FF0000"/>
+            </a:solidFill>
+          </a:ln>
+        </p:spPr>
+        <p:style>
+          <a:lnRef idx="2">
+            <a:schemeClr val="accent1">
+              <a:shade val="50000"/>
+            </a:schemeClr>
+          </a:lnRef>
+          <a:fillRef idx="1">
+            <a:schemeClr val="accent1"/>
+          </a:fillRef>
+          <a:effectRef idx="0">
+            <a:schemeClr val="accent1"/>
+          </a:effectRef>
+          <a:fontRef idx="minor">
+            <a:schemeClr val="lt1"/>
+          </a:fontRef>
+        </p:style>
+        <p:txBody>
+          <a:bodyPr rtlCol="0" anchor="ctr"/>
+          <a:lstStyle/>
+          <a:p>
+            <a:pPr algn="ctr"/>
+            <a:endParaRPr lang="en-US"/>
+          </a:p>
+        </p:txBody>
+      </p:sp>
+      <p:sp>
+        <p:nvSpPr>
+          <p:cNvPr id="11" name="Rectangle 10">
+            <a:extLst>
+              <a:ext uri="{FF2B5EF4-FFF2-40B4-BE49-F238E27FC236}">
+                <a16:creationId xmlns:a16="http://schemas.microsoft.com/office/drawing/2014/main" id="{5E732457-0EBD-457E-B416-5E05D7160ED2}"/>
+              </a:ext>
+            </a:extLst>
+          </p:cNvPr>
+          <p:cNvSpPr/>
+          <p:nvPr/>
+        </p:nvSpPr>
+        <p:spPr>
+          <a:xfrm>
+            <a:off x="6379429" y="1739378"/>
+            <a:ext cx="609600" cy="4778276"/>
+          </a:xfrm>
+          <a:prstGeom prst="rect">
+            <a:avLst/>
+          </a:prstGeom>
+          <a:noFill/>
+          <a:ln w="38100">
+            <a:solidFill>
+              <a:srgbClr val="FF0000"/>
+            </a:solidFill>
+          </a:ln>
+        </p:spPr>
+        <p:style>
+          <a:lnRef idx="2">
+            <a:schemeClr val="accent1">
+              <a:shade val="50000"/>
+            </a:schemeClr>
+          </a:lnRef>
+          <a:fillRef idx="1">
+            <a:schemeClr val="accent1"/>
+          </a:fillRef>
+          <a:effectRef idx="0">
+            <a:schemeClr val="accent1"/>
+          </a:effectRef>
+          <a:fontRef idx="minor">
+            <a:schemeClr val="lt1"/>
+          </a:fontRef>
+        </p:style>
+        <p:txBody>
+          <a:bodyPr rtlCol="0" anchor="ctr"/>
+          <a:lstStyle/>
+          <a:p>
+            <a:pPr algn="ctr"/>
+            <a:endParaRPr lang="en-US"/>
+          </a:p>
+        </p:txBody>
+      </p:sp>
+    </p:spTree>
+    <p:extLst>
+      <p:ext uri="{BB962C8B-B14F-4D97-AF65-F5344CB8AC3E}">
+        <p14:creationId xmlns:p14="http://schemas.microsoft.com/office/powerpoint/2010/main" val="234752353"/>
+      </p:ext>
+    </p:extLst>
+  </p:cSld>
+  <p:clrMapOvr>
+    <a:masterClrMapping/>
+  </p:clrMapOvr>
+  <p:timing>
+    <p:tnLst>
+      <p:par>
+        <p:cTn id="1" dur="indefinite" restart="never" nodeType="tmRoot">
+          <p:childTnLst>
+            <p:seq concurrent="1" nextAc="seek">
+              <p:cTn id="2" dur="indefinite" nodeType="mainSeq">
+                <p:childTnLst>
+                  <p:par>
+                    <p:cTn id="3" fill="hold">
+                      <p:stCondLst>
+                        <p:cond delay="indefinite"/>
+                      </p:stCondLst>
+                      <p:childTnLst>
+                        <p:par>
+                          <p:cTn id="4" fill="hold">
+                            <p:stCondLst>
+                              <p:cond delay="0"/>
+                            </p:stCondLst>
+                            <p:childTnLst>
+                              <p:par>
+                                <p:cTn id="5" presetID="1" presetClass="entr" presetSubtype="0" fill="hold" grpId="0" nodeType="clickEffect">
+                                  <p:stCondLst>
+                                    <p:cond delay="0"/>
+                                  </p:stCondLst>
+                                  <p:childTnLst>
+                                    <p:set>
+                                      <p:cBhvr>
+                                        <p:cTn id="6" dur="1" fill="hold">
+                                          <p:stCondLst>
+                                            <p:cond delay="0"/>
+                                          </p:stCondLst>
+                                        </p:cTn>
+                                        <p:tgtEl>
+                                          <p:spTgt spid="10"/>
+                                        </p:tgtEl>
+                                        <p:attrNameLst>
+                                          <p:attrName>style.visibility</p:attrName>
+                                        </p:attrNameLst>
+                                      </p:cBhvr>
+                                      <p:to>
+                                        <p:strVal val="visible"/>
+                                      </p:to>
+                                    </p:set>
+                                  </p:childTnLst>
+                                </p:cTn>
+                              </p:par>
+                              <p:par>
+                                <p:cTn id="7" presetID="1" presetClass="entr" presetSubtype="0" fill="hold" grpId="0" nodeType="withEffect">
+                                  <p:stCondLst>
+                                    <p:cond delay="0"/>
+                                  </p:stCondLst>
+                                  <p:childTnLst>
+                                    <p:set>
+                                      <p:cBhvr>
+                                        <p:cTn id="8" dur="1" fill="hold">
+                                          <p:stCondLst>
+                                            <p:cond delay="0"/>
+                                          </p:stCondLst>
+                                        </p:cTn>
+                                        <p:tgtEl>
+                                          <p:spTgt spid="11"/>
+                                        </p:tgtEl>
+                                        <p:attrNameLst>
+                                          <p:attrName>style.visibility</p:attrName>
+                                        </p:attrNameLst>
+                                      </p:cBhvr>
+                                      <p:to>
+                                        <p:strVal val="visible"/>
+                                      </p:to>
+                                    </p:set>
+                                  </p:childTnLst>
+                                </p:cTn>
+                              </p:par>
+                            </p:childTnLst>
+                          </p:cTn>
+                        </p:par>
+                      </p:childTnLst>
+                    </p:cTn>
+                  </p:par>
+                </p:childTnLst>
+              </p:cTn>
+              <p:prevCondLst>
+                <p:cond evt="onPrev" delay="0">
+                  <p:tgtEl>
+                    <p:sldTgt/>
+                  </p:tgtEl>
+                </p:cond>
+              </p:prevCondLst>
+              <p:nextCondLst>
+                <p:cond evt="onNext" delay="0">
+                  <p:tgtEl>
+                    <p:sldTgt/>
+                  </p:tgtEl>
+                </p:cond>
+              </p:nextCondLst>
+            </p:seq>
+          </p:childTnLst>
+        </p:cTn>
+      </p:par>
+    </p:tnLst>
+    <p:bldLst>
+      <p:bldP spid="10" grpId="0" animBg="1"/>
+      <p:bldP spid="11" grpId="0" animBg="1"/>
+    </p:bldLst>
+  </p:timing>
+</p:sld>
+</file>
+
 <file path=ppt/theme/theme1.xml><?xml version="1.0" encoding="utf-8"?>
 <a:theme xmlns:a="http://schemas.openxmlformats.org/drawingml/2006/main" name="Office Theme">
   <a:themeElements>

</xml_diff>